<commit_message>
Update Post Zoom Session
</commit_message>
<xml_diff>
--- a/Project 1 Presentation.pptx
+++ b/Project 1 Presentation.pptx
@@ -5,7 +5,7 @@
     <p:sldMasterId id="2147483713" r:id="rId1"/>
   </p:sldMasterIdLst>
   <p:notesMasterIdLst>
-    <p:notesMasterId r:id="rId22"/>
+    <p:notesMasterId r:id="rId18"/>
   </p:notesMasterIdLst>
   <p:sldIdLst>
     <p:sldId id="256" r:id="rId2"/>
@@ -16,18 +16,14 @@
     <p:sldId id="260" r:id="rId7"/>
     <p:sldId id="272" r:id="rId8"/>
     <p:sldId id="273" r:id="rId9"/>
-    <p:sldId id="268" r:id="rId10"/>
-    <p:sldId id="270" r:id="rId11"/>
-    <p:sldId id="274" r:id="rId12"/>
-    <p:sldId id="275" r:id="rId13"/>
-    <p:sldId id="269" r:id="rId14"/>
-    <p:sldId id="276" r:id="rId15"/>
-    <p:sldId id="277" r:id="rId16"/>
-    <p:sldId id="271" r:id="rId17"/>
-    <p:sldId id="262" r:id="rId18"/>
-    <p:sldId id="263" r:id="rId19"/>
-    <p:sldId id="264" r:id="rId20"/>
-    <p:sldId id="265" r:id="rId21"/>
+    <p:sldId id="270" r:id="rId10"/>
+    <p:sldId id="274" r:id="rId11"/>
+    <p:sldId id="275" r:id="rId12"/>
+    <p:sldId id="271" r:id="rId13"/>
+    <p:sldId id="262" r:id="rId14"/>
+    <p:sldId id="263" r:id="rId15"/>
+    <p:sldId id="264" r:id="rId16"/>
+    <p:sldId id="265" r:id="rId17"/>
   </p:sldIdLst>
   <p:sldSz cx="12192000" cy="6858000"/>
   <p:notesSz cx="6858000" cy="9144000"/>
@@ -219,7 +215,7 @@
           <a:p>
             <a:fld id="{2429B6F7-E88D-5542-86AE-E68B90A8D5D5}" type="datetimeFigureOut">
               <a:rPr lang="en-US" smtClean="0"/>
-              <a:t>2/4/2021</a:t>
+              <a:t>2/4/21</a:t>
             </a:fld>
             <a:endParaRPr lang="en-US"/>
           </a:p>
@@ -531,7 +527,10 @@
           <a:bodyPr/>
           <a:lstStyle/>
           <a:p>
-            <a:endParaRPr lang="en-AU" dirty="0"/>
+            <a:r>
+              <a:rPr lang="en-AU" dirty="0"/>
+              <a:t>Kylie</a:t>
+            </a:r>
           </a:p>
         </p:txBody>
       </p:sp>
@@ -616,26 +615,18 @@
           <a:lstStyle/>
           <a:p>
             <a:r>
-              <a:rPr lang="en-AU" dirty="0">
-                <a:solidFill>
-                  <a:srgbClr val="FF0000"/>
-                </a:solidFill>
-              </a:rPr>
-              <a:t>Insert graphs</a:t>
-            </a:r>
-          </a:p>
-          <a:p>
-            <a:r>
-              <a:rPr lang="en-AU" dirty="0">
-                <a:solidFill>
-                  <a:srgbClr val="FF0000"/>
-                </a:solidFill>
-              </a:rPr>
-              <a:t>Insert insights – list suburbs that are in the bottom 10 over the past five financial years.</a:t>
+              <a:rPr lang="en-AU" dirty="0"/>
+              <a:t>Miki</a:t>
             </a:r>
           </a:p>
           <a:p>
             <a:endParaRPr lang="en-AU" dirty="0"/>
+          </a:p>
+          <a:p>
+            <a:r>
+              <a:rPr lang="en-AU" dirty="0"/>
+              <a:t>Missing 2016 -2017 chart</a:t>
+            </a:r>
           </a:p>
         </p:txBody>
       </p:sp>
@@ -656,7 +647,7 @@
           <a:p>
             <a:fld id="{4F2AAB9E-B1B6-7347-AEB9-3DE8A4E8C48F}" type="slidenum">
               <a:rPr lang="en-US" smtClean="0"/>
-              <a:t>13</a:t>
+              <a:t>10</a:t>
             </a:fld>
             <a:endParaRPr lang="en-US"/>
           </a:p>
@@ -665,7 +656,7 @@
     </p:spTree>
     <p:extLst>
       <p:ext uri="{BB962C8B-B14F-4D97-AF65-F5344CB8AC3E}">
-        <p14:creationId xmlns:p14="http://schemas.microsoft.com/office/powerpoint/2010/main" val="3821414977"/>
+        <p14:creationId xmlns:p14="http://schemas.microsoft.com/office/powerpoint/2010/main" val="1682390266"/>
       </p:ext>
     </p:extLst>
   </p:cSld>
@@ -720,8 +711,8 @@
           <a:lstStyle/>
           <a:p>
             <a:r>
-              <a:rPr lang="en-AU" dirty="0"/>
-              <a:t>Chart 2016-2017 missing</a:t>
+              <a:rPr lang="en-US" dirty="0"/>
+              <a:t>Miki</a:t>
             </a:r>
           </a:p>
         </p:txBody>
@@ -743,7 +734,7 @@
           <a:p>
             <a:fld id="{4F2AAB9E-B1B6-7347-AEB9-3DE8A4E8C48F}" type="slidenum">
               <a:rPr lang="en-US" smtClean="0"/>
-              <a:t>14</a:t>
+              <a:t>11</a:t>
             </a:fld>
             <a:endParaRPr lang="en-US"/>
           </a:p>
@@ -752,7 +743,7 @@
     </p:spTree>
     <p:extLst>
       <p:ext uri="{BB962C8B-B14F-4D97-AF65-F5344CB8AC3E}">
-        <p14:creationId xmlns:p14="http://schemas.microsoft.com/office/powerpoint/2010/main" val="4248295468"/>
+        <p14:creationId xmlns:p14="http://schemas.microsoft.com/office/powerpoint/2010/main" val="4053908687"/>
       </p:ext>
     </p:extLst>
   </p:cSld>
@@ -808,6 +799,15 @@
           <a:p>
             <a:r>
               <a:rPr lang="en-US" dirty="0"/>
+              <a:t>Nick</a:t>
+            </a:r>
+          </a:p>
+          <a:p>
+            <a:endParaRPr lang="en-US" dirty="0"/>
+          </a:p>
+          <a:p>
+            <a:r>
+              <a:rPr lang="en-US" dirty="0"/>
               <a:t>Potentially just show one graph</a:t>
             </a:r>
           </a:p>
@@ -844,7 +844,7 @@
           <a:p>
             <a:fld id="{4F2AAB9E-B1B6-7347-AEB9-3DE8A4E8C48F}" type="slidenum">
               <a:rPr lang="en-US" smtClean="0"/>
-              <a:t>16</a:t>
+              <a:t>12</a:t>
             </a:fld>
             <a:endParaRPr lang="en-US"/>
           </a:p>
@@ -907,7 +907,20 @@
           <a:bodyPr/>
           <a:lstStyle/>
           <a:p>
-            <a:endParaRPr lang="en-US" dirty="0"/>
+            <a:r>
+              <a:rPr lang="en-US" dirty="0" err="1"/>
+              <a:t>Presit</a:t>
+            </a:r>
+            <a:r>
+              <a:rPr lang="en-US" dirty="0"/>
+              <a:t> – Challenges </a:t>
+            </a:r>
+          </a:p>
+          <a:p>
+            <a:r>
+              <a:rPr lang="en-US" dirty="0"/>
+              <a:t>Nick – Additional project time</a:t>
+            </a:r>
           </a:p>
         </p:txBody>
       </p:sp>
@@ -928,7 +941,7 @@
           <a:p>
             <a:fld id="{4F2AAB9E-B1B6-7347-AEB9-3DE8A4E8C48F}" type="slidenum">
               <a:rPr lang="en-US" smtClean="0"/>
-              <a:t>17</a:t>
+              <a:t>13</a:t>
             </a:fld>
             <a:endParaRPr lang="en-US"/>
           </a:p>
@@ -1012,7 +1025,7 @@
           <a:p>
             <a:fld id="{4F2AAB9E-B1B6-7347-AEB9-3DE8A4E8C48F}" type="slidenum">
               <a:rPr lang="en-US" smtClean="0"/>
-              <a:t>18</a:t>
+              <a:t>14</a:t>
             </a:fld>
             <a:endParaRPr lang="en-US"/>
           </a:p>
@@ -1084,6 +1097,29 @@
                   <a:srgbClr val="FFFF00"/>
                 </a:highlight>
               </a:rPr>
+              <a:t>Kylie</a:t>
+            </a:r>
+          </a:p>
+          <a:p>
+            <a:pPr marL="0" indent="0">
+              <a:buNone/>
+            </a:pPr>
+            <a:endParaRPr lang="en-US" dirty="0">
+              <a:highlight>
+                <a:srgbClr val="FFFF00"/>
+              </a:highlight>
+            </a:endParaRPr>
+          </a:p>
+          <a:p>
+            <a:pPr marL="0" indent="0">
+              <a:buNone/>
+            </a:pPr>
+            <a:r>
+              <a:rPr lang="en-US" dirty="0">
+                <a:highlight>
+                  <a:srgbClr val="FFFF00"/>
+                </a:highlight>
+              </a:rPr>
               <a:t>Describe the questions you asked, and </a:t>
             </a:r>
             <a:r>
@@ -1281,6 +1317,57 @@
                   <a:srgbClr val="FFFF00"/>
                 </a:highlight>
               </a:rPr>
+              <a:t>Kylie</a:t>
+            </a:r>
+          </a:p>
+          <a:p>
+            <a:pPr marL="0" marR="0" lvl="0" indent="0" algn="l" defTabSz="914400" rtl="0" eaLnBrk="1" fontAlgn="auto" latinLnBrk="0" hangingPunct="1">
+              <a:lnSpc>
+                <a:spcPct val="100000"/>
+              </a:lnSpc>
+              <a:spcBef>
+                <a:spcPts val="0"/>
+              </a:spcBef>
+              <a:spcAft>
+                <a:spcPts val="0"/>
+              </a:spcAft>
+              <a:buClrTx/>
+              <a:buSzTx/>
+              <a:buFontTx/>
+              <a:buNone/>
+              <a:tabLst/>
+              <a:defRPr/>
+            </a:pPr>
+            <a:endParaRPr lang="en-US" dirty="0">
+              <a:highlight>
+                <a:srgbClr val="FFFF00"/>
+              </a:highlight>
+            </a:endParaRPr>
+          </a:p>
+          <a:p>
+            <a:pPr marL="0" marR="0" lvl="0" indent="0" algn="l" defTabSz="914400" rtl="0" eaLnBrk="1" fontAlgn="auto" latinLnBrk="0" hangingPunct="1">
+              <a:lnSpc>
+                <a:spcPct val="100000"/>
+              </a:lnSpc>
+              <a:spcBef>
+                <a:spcPts val="0"/>
+              </a:spcBef>
+              <a:spcAft>
+                <a:spcPts val="0"/>
+              </a:spcAft>
+              <a:buClrTx/>
+              <a:buSzTx/>
+              <a:buFontTx/>
+              <a:buNone/>
+              <a:tabLst/>
+              <a:defRPr/>
+            </a:pPr>
+            <a:r>
+              <a:rPr lang="en-US" dirty="0">
+                <a:highlight>
+                  <a:srgbClr val="FFFF00"/>
+                </a:highlight>
+              </a:rPr>
               <a:t>During the slide talk about:</a:t>
             </a:r>
           </a:p>
@@ -1616,7 +1703,7 @@
           <a:p>
             <a:r>
               <a:rPr lang="en-US" dirty="0"/>
-              <a:t>Nick to complete</a:t>
+              <a:t>Kylie</a:t>
             </a:r>
           </a:p>
           <a:p>
@@ -2013,9 +2100,10 @@
               <a:defRPr/>
             </a:pPr>
             <a:r>
-              <a:rPr lang="en-US" dirty="0"/>
-              <a:t>One excel document per quarter, a lot of data to merge</a:t>
-            </a:r>
+              <a:rPr lang="en-US" dirty="0" err="1"/>
+              <a:t>Presit</a:t>
+            </a:r>
+            <a:endParaRPr lang="en-US" dirty="0"/>
           </a:p>
           <a:p>
             <a:pPr marL="0" marR="0" lvl="0" indent="0" algn="l" defTabSz="914400" rtl="0" eaLnBrk="1" fontAlgn="auto" latinLnBrk="0" hangingPunct="1">
@@ -2035,18 +2123,7 @@
               <a:tabLst/>
               <a:defRPr/>
             </a:pPr>
-            <a:r>
-              <a:rPr lang="en-US" dirty="0"/>
-              <a:t>Lots of </a:t>
-            </a:r>
-            <a:r>
-              <a:rPr lang="en-US" dirty="0" err="1"/>
-              <a:t>NaN</a:t>
-            </a:r>
-            <a:r>
-              <a:rPr lang="en-US" dirty="0"/>
-              <a:t> in the combining of the data due to quarterly data – Median</a:t>
-            </a:r>
+            <a:endParaRPr lang="en-US" dirty="0"/>
           </a:p>
           <a:p>
             <a:pPr marL="0" marR="0" lvl="0" indent="0" algn="l" defTabSz="914400" rtl="0" eaLnBrk="1" fontAlgn="auto" latinLnBrk="0" hangingPunct="1">
@@ -2068,7 +2145,69 @@
             </a:pPr>
             <a:r>
               <a:rPr lang="en-US" dirty="0"/>
-              <a:t>Finding the best way to merge data</a:t>
+              <a:t>One excel document per quarter, a lot of data to merge</a:t>
+            </a:r>
+          </a:p>
+          <a:p>
+            <a:pPr marL="0" marR="0" lvl="0" indent="0" algn="l" defTabSz="914400" rtl="0" eaLnBrk="1" fontAlgn="auto" latinLnBrk="0" hangingPunct="1">
+              <a:lnSpc>
+                <a:spcPct val="100000"/>
+              </a:lnSpc>
+              <a:spcBef>
+                <a:spcPts val="0"/>
+              </a:spcBef>
+              <a:spcAft>
+                <a:spcPts val="0"/>
+              </a:spcAft>
+              <a:buClrTx/>
+              <a:buSzTx/>
+              <a:buFontTx/>
+              <a:buNone/>
+              <a:tabLst/>
+              <a:defRPr/>
+            </a:pPr>
+            <a:r>
+              <a:rPr lang="en-US" dirty="0"/>
+              <a:t>Lots of </a:t>
+            </a:r>
+            <a:r>
+              <a:rPr lang="en-US" dirty="0" err="1"/>
+              <a:t>NaN</a:t>
+            </a:r>
+            <a:r>
+              <a:rPr lang="en-US" dirty="0"/>
+              <a:t> in the combining of the data due to quarterly data – Median</a:t>
+            </a:r>
+          </a:p>
+          <a:p>
+            <a:pPr marL="0" marR="0" lvl="0" indent="0" algn="l" defTabSz="914400" rtl="0" eaLnBrk="1" fontAlgn="auto" latinLnBrk="0" hangingPunct="1">
+              <a:lnSpc>
+                <a:spcPct val="100000"/>
+              </a:lnSpc>
+              <a:spcBef>
+                <a:spcPts val="0"/>
+              </a:spcBef>
+              <a:spcAft>
+                <a:spcPts val="0"/>
+              </a:spcAft>
+              <a:buClrTx/>
+              <a:buSzTx/>
+              <a:buFontTx/>
+              <a:buNone/>
+              <a:tabLst/>
+              <a:defRPr/>
+            </a:pPr>
+            <a:r>
+              <a:rPr lang="en-US" dirty="0"/>
+              <a:t>Finding the best way to merge data (</a:t>
+            </a:r>
+            <a:r>
+              <a:rPr lang="en-US" dirty="0" err="1"/>
+              <a:t>concat</a:t>
+            </a:r>
+            <a:r>
+              <a:rPr lang="en-US" dirty="0"/>
+              <a:t> vs merge)</a:t>
             </a:r>
           </a:p>
           <a:p>
@@ -2164,6 +2303,15 @@
           <a:p>
             <a:r>
               <a:rPr lang="en-AU" dirty="0"/>
+              <a:t>Annabel</a:t>
+            </a:r>
+          </a:p>
+          <a:p>
+            <a:endParaRPr lang="en-AU" dirty="0"/>
+          </a:p>
+          <a:p>
+            <a:r>
+              <a:rPr lang="en-AU" dirty="0"/>
               <a:t>Adelaide (#1 for the whole time)</a:t>
             </a:r>
           </a:p>
@@ -2327,8 +2475,8 @@
           <a:lstStyle/>
           <a:p>
             <a:r>
-              <a:rPr lang="en-AU" dirty="0"/>
-              <a:t>No graph or bottom 10 as there are an excessive number of locations with just 1 crime for the period of time.  To be able to define a bottom 10 other variables would need to be considered</a:t>
+              <a:rPr lang="en-US" dirty="0"/>
+              <a:t>Annabel</a:t>
             </a:r>
           </a:p>
         </p:txBody>
@@ -2350,7 +2498,7 @@
           <a:p>
             <a:fld id="{4F2AAB9E-B1B6-7347-AEB9-3DE8A4E8C48F}" type="slidenum">
               <a:rPr lang="en-US" smtClean="0"/>
-              <a:t>9</a:t>
+              <a:t>7</a:t>
             </a:fld>
             <a:endParaRPr lang="en-US"/>
           </a:p>
@@ -2359,7 +2507,7 @@
     </p:spTree>
     <p:extLst>
       <p:ext uri="{BB962C8B-B14F-4D97-AF65-F5344CB8AC3E}">
-        <p14:creationId xmlns:p14="http://schemas.microsoft.com/office/powerpoint/2010/main" val="2652640691"/>
+        <p14:creationId xmlns:p14="http://schemas.microsoft.com/office/powerpoint/2010/main" val="2495370457"/>
       </p:ext>
     </p:extLst>
   </p:cSld>
@@ -2414,26 +2562,9 @@
           <a:lstStyle/>
           <a:p>
             <a:r>
-              <a:rPr lang="en-AU" dirty="0">
-                <a:solidFill>
-                  <a:srgbClr val="FF0000"/>
-                </a:solidFill>
-              </a:rPr>
-              <a:t>Insert graphs</a:t>
-            </a:r>
-          </a:p>
-          <a:p>
-            <a:r>
-              <a:rPr lang="en-AU" dirty="0">
-                <a:solidFill>
-                  <a:srgbClr val="FF0000"/>
-                </a:solidFill>
-              </a:rPr>
-              <a:t>Insert insights – list suburbs that are in the top 10 over the past five financial years</a:t>
-            </a:r>
-          </a:p>
-          <a:p>
-            <a:endParaRPr lang="en-AU" dirty="0"/>
+              <a:rPr lang="en-US" dirty="0"/>
+              <a:t>Annabel</a:t>
+            </a:r>
           </a:p>
         </p:txBody>
       </p:sp>
@@ -2454,7 +2585,7 @@
           <a:p>
             <a:fld id="{4F2AAB9E-B1B6-7347-AEB9-3DE8A4E8C48F}" type="slidenum">
               <a:rPr lang="en-US" smtClean="0"/>
-              <a:t>10</a:t>
+              <a:t>8</a:t>
             </a:fld>
             <a:endParaRPr lang="en-US"/>
           </a:p>
@@ -2463,7 +2594,7 @@
     </p:spTree>
     <p:extLst>
       <p:ext uri="{BB962C8B-B14F-4D97-AF65-F5344CB8AC3E}">
-        <p14:creationId xmlns:p14="http://schemas.microsoft.com/office/powerpoint/2010/main" val="1074054908"/>
+        <p14:creationId xmlns:p14="http://schemas.microsoft.com/office/powerpoint/2010/main" val="254680774"/>
       </p:ext>
     </p:extLst>
   </p:cSld>
@@ -2518,9 +2649,43 @@
           <a:lstStyle/>
           <a:p>
             <a:r>
-              <a:rPr lang="en-AU" dirty="0"/>
-              <a:t>Missing 2016 -2017 chart</a:t>
-            </a:r>
+              <a:rPr lang="en-AU" dirty="0">
+                <a:solidFill>
+                  <a:srgbClr val="FF0000"/>
+                </a:solidFill>
+              </a:rPr>
+              <a:t>Miki</a:t>
+            </a:r>
+          </a:p>
+          <a:p>
+            <a:endParaRPr lang="en-AU" dirty="0">
+              <a:solidFill>
+                <a:srgbClr val="FF0000"/>
+              </a:solidFill>
+            </a:endParaRPr>
+          </a:p>
+          <a:p>
+            <a:r>
+              <a:rPr lang="en-AU" dirty="0">
+                <a:solidFill>
+                  <a:srgbClr val="FF0000"/>
+                </a:solidFill>
+              </a:rPr>
+              <a:t>Insert graphs</a:t>
+            </a:r>
+          </a:p>
+          <a:p>
+            <a:r>
+              <a:rPr lang="en-AU" dirty="0">
+                <a:solidFill>
+                  <a:srgbClr val="FF0000"/>
+                </a:solidFill>
+              </a:rPr>
+              <a:t>Insert insights – list suburbs that are in the top 10 over the past five financial years</a:t>
+            </a:r>
+          </a:p>
+          <a:p>
+            <a:endParaRPr lang="en-AU" dirty="0"/>
           </a:p>
         </p:txBody>
       </p:sp>
@@ -2541,7 +2706,7 @@
           <a:p>
             <a:fld id="{4F2AAB9E-B1B6-7347-AEB9-3DE8A4E8C48F}" type="slidenum">
               <a:rPr lang="en-US" smtClean="0"/>
-              <a:t>11</a:t>
+              <a:t>9</a:t>
             </a:fld>
             <a:endParaRPr lang="en-US"/>
           </a:p>
@@ -2550,7 +2715,7 @@
     </p:spTree>
     <p:extLst>
       <p:ext uri="{BB962C8B-B14F-4D97-AF65-F5344CB8AC3E}">
-        <p14:creationId xmlns:p14="http://schemas.microsoft.com/office/powerpoint/2010/main" val="1682390266"/>
+        <p14:creationId xmlns:p14="http://schemas.microsoft.com/office/powerpoint/2010/main" val="1074054908"/>
       </p:ext>
     </p:extLst>
   </p:cSld>
@@ -2723,7 +2888,7 @@
           <a:p>
             <a:fld id="{FD85B985-76B1-472F-AE68-4120063CE451}" type="datetimeFigureOut">
               <a:rPr lang="en-AU" smtClean="0"/>
-              <a:t>4/02/2021</a:t>
+              <a:t>4/2/21</a:t>
             </a:fld>
             <a:endParaRPr lang="en-AU"/>
           </a:p>
@@ -2893,7 +3058,7 @@
           <a:p>
             <a:fld id="{FD85B985-76B1-472F-AE68-4120063CE451}" type="datetimeFigureOut">
               <a:rPr lang="en-AU" smtClean="0"/>
-              <a:t>4/02/2021</a:t>
+              <a:t>4/2/21</a:t>
             </a:fld>
             <a:endParaRPr lang="en-AU"/>
           </a:p>
@@ -3073,7 +3238,7 @@
           <a:p>
             <a:fld id="{FD85B985-76B1-472F-AE68-4120063CE451}" type="datetimeFigureOut">
               <a:rPr lang="en-AU" smtClean="0"/>
-              <a:t>4/02/2021</a:t>
+              <a:t>4/2/21</a:t>
             </a:fld>
             <a:endParaRPr lang="en-AU"/>
           </a:p>
@@ -3243,7 +3408,7 @@
           <a:p>
             <a:fld id="{FD85B985-76B1-472F-AE68-4120063CE451}" type="datetimeFigureOut">
               <a:rPr lang="en-AU" smtClean="0"/>
-              <a:t>4/02/2021</a:t>
+              <a:t>4/2/21</a:t>
             </a:fld>
             <a:endParaRPr lang="en-AU"/>
           </a:p>
@@ -3511,7 +3676,7 @@
           <a:p>
             <a:fld id="{FD85B985-76B1-472F-AE68-4120063CE451}" type="datetimeFigureOut">
               <a:rPr lang="en-AU" smtClean="0"/>
-              <a:t>4/02/2021</a:t>
+              <a:t>4/2/21</a:t>
             </a:fld>
             <a:endParaRPr lang="en-AU"/>
           </a:p>
@@ -3743,7 +3908,7 @@
           <a:p>
             <a:fld id="{FD85B985-76B1-472F-AE68-4120063CE451}" type="datetimeFigureOut">
               <a:rPr lang="en-AU" smtClean="0"/>
-              <a:t>4/02/2021</a:t>
+              <a:t>4/2/21</a:t>
             </a:fld>
             <a:endParaRPr lang="en-AU"/>
           </a:p>
@@ -4102,7 +4267,7 @@
           <a:p>
             <a:fld id="{FD85B985-76B1-472F-AE68-4120063CE451}" type="datetimeFigureOut">
               <a:rPr lang="en-AU" smtClean="0"/>
-              <a:t>4/02/2021</a:t>
+              <a:t>4/2/21</a:t>
             </a:fld>
             <a:endParaRPr lang="en-AU"/>
           </a:p>
@@ -4243,7 +4408,7 @@
           <a:p>
             <a:fld id="{FD85B985-76B1-472F-AE68-4120063CE451}" type="datetimeFigureOut">
               <a:rPr lang="en-AU" smtClean="0"/>
-              <a:t>4/02/2021</a:t>
+              <a:t>4/2/21</a:t>
             </a:fld>
             <a:endParaRPr lang="en-AU"/>
           </a:p>
@@ -4338,7 +4503,7 @@
           <a:p>
             <a:fld id="{FD85B985-76B1-472F-AE68-4120063CE451}" type="datetimeFigureOut">
               <a:rPr lang="en-AU" smtClean="0"/>
-              <a:t>4/02/2021</a:t>
+              <a:t>4/2/21</a:t>
             </a:fld>
             <a:endParaRPr lang="en-AU"/>
           </a:p>
@@ -4695,7 +4860,7 @@
           <a:p>
             <a:fld id="{FD85B985-76B1-472F-AE68-4120063CE451}" type="datetimeFigureOut">
               <a:rPr lang="en-AU" smtClean="0"/>
-              <a:t>4/02/2021</a:t>
+              <a:t>4/2/21</a:t>
             </a:fld>
             <a:endParaRPr lang="en-AU"/>
           </a:p>
@@ -5052,7 +5217,7 @@
           <a:p>
             <a:fld id="{FD85B985-76B1-472F-AE68-4120063CE451}" type="datetimeFigureOut">
               <a:rPr lang="en-AU" smtClean="0"/>
-              <a:t>4/02/2021</a:t>
+              <a:t>4/2/21</a:t>
             </a:fld>
             <a:endParaRPr lang="en-AU"/>
           </a:p>
@@ -5294,7 +5459,7 @@
           <a:p>
             <a:fld id="{FD85B985-76B1-472F-AE68-4120063CE451}" type="datetimeFigureOut">
               <a:rPr lang="en-AU" smtClean="0"/>
-              <a:t>4/02/2021</a:t>
+              <a:t>4/2/21</a:t>
             </a:fld>
             <a:endParaRPr lang="en-AU"/>
           </a:p>
@@ -6145,116 +6310,6 @@
           <p:cNvPr id="2" name="Title 1">
             <a:extLst>
               <a:ext uri="{FF2B5EF4-FFF2-40B4-BE49-F238E27FC236}">
-                <a16:creationId xmlns:a16="http://schemas.microsoft.com/office/drawing/2014/main" id="{D4112190-B47C-470F-9F25-6023D45B677C}"/>
-              </a:ext>
-            </a:extLst>
-          </p:cNvPr>
-          <p:cNvSpPr>
-            <a:spLocks noGrp="1"/>
-          </p:cNvSpPr>
-          <p:nvPr>
-            <p:ph type="title"/>
-          </p:nvPr>
-        </p:nvSpPr>
-        <p:spPr/>
-        <p:txBody>
-          <a:bodyPr>
-            <a:normAutofit fontScale="90000"/>
-          </a:bodyPr>
-          <a:lstStyle/>
-          <a:p>
-            <a:r>
-              <a:rPr lang="en-US" dirty="0"/>
-              <a:t>Data </a:t>
-            </a:r>
-            <a:r>
-              <a:rPr lang="en-US" dirty="0" err="1"/>
-              <a:t>AnalysiS</a:t>
-            </a:r>
-            <a:br>
-              <a:rPr lang="en-US" dirty="0"/>
-            </a:br>
-            <a:r>
-              <a:rPr lang="en-US" dirty="0"/>
-              <a:t> TOP 10 SUBURBS BY PROPERTY PRICE</a:t>
-            </a:r>
-            <a:br>
-              <a:rPr lang="en-US" dirty="0"/>
-            </a:br>
-            <a:endParaRPr lang="en-AU" dirty="0"/>
-          </a:p>
-        </p:txBody>
-      </p:sp>
-      <p:pic>
-        <p:nvPicPr>
-          <p:cNvPr id="5" name="Content Placeholder 4" descr="Icon&#10;&#10;Description automatically generated">
-            <a:extLst>
-              <a:ext uri="{FF2B5EF4-FFF2-40B4-BE49-F238E27FC236}">
-                <a16:creationId xmlns:a16="http://schemas.microsoft.com/office/drawing/2014/main" id="{8C3E7055-D6FF-4E94-8DBD-D142F3407FF2}"/>
-              </a:ext>
-            </a:extLst>
-          </p:cNvPr>
-          <p:cNvPicPr>
-            <a:picLocks noGrp="1" noChangeAspect="1"/>
-          </p:cNvPicPr>
-          <p:nvPr>
-            <p:ph idx="1"/>
-          </p:nvPr>
-        </p:nvPicPr>
-        <p:blipFill>
-          <a:blip r:embed="rId3">
-            <a:extLst>
-              <a:ext uri="{28A0092B-C50C-407E-A947-70E740481C1C}">
-                <a14:useLocalDpi xmlns:a14="http://schemas.microsoft.com/office/drawing/2010/main" val="0"/>
-              </a:ext>
-            </a:extLst>
-          </a:blip>
-          <a:stretch>
-            <a:fillRect/>
-          </a:stretch>
-        </p:blipFill>
-        <p:spPr>
-          <a:xfrm>
-            <a:off x="1137510" y="2795469"/>
-            <a:ext cx="4542500" cy="3097837"/>
-          </a:xfrm>
-        </p:spPr>
-      </p:pic>
-    </p:spTree>
-    <p:extLst>
-      <p:ext uri="{BB962C8B-B14F-4D97-AF65-F5344CB8AC3E}">
-        <p14:creationId xmlns:p14="http://schemas.microsoft.com/office/powerpoint/2010/main" val="3150616333"/>
-      </p:ext>
-    </p:extLst>
-  </p:cSld>
-  <p:clrMapOvr>
-    <a:masterClrMapping/>
-  </p:clrMapOvr>
-</p:sld>
-</file>
-
-<file path=ppt/slides/slide11.xml><?xml version="1.0" encoding="utf-8"?>
-<p:sld xmlns:a="http://schemas.openxmlformats.org/drawingml/2006/main" xmlns:r="http://schemas.openxmlformats.org/officeDocument/2006/relationships" xmlns:p="http://schemas.openxmlformats.org/presentationml/2006/main">
-  <p:cSld>
-    <p:spTree>
-      <p:nvGrpSpPr>
-        <p:cNvPr id="1" name=""/>
-        <p:cNvGrpSpPr/>
-        <p:nvPr/>
-      </p:nvGrpSpPr>
-      <p:grpSpPr>
-        <a:xfrm>
-          <a:off x="0" y="0"/>
-          <a:ext cx="0" cy="0"/>
-          <a:chOff x="0" y="0"/>
-          <a:chExt cx="0" cy="0"/>
-        </a:xfrm>
-      </p:grpSpPr>
-      <p:sp>
-        <p:nvSpPr>
-          <p:cNvPr id="2" name="Title 1">
-            <a:extLst>
-              <a:ext uri="{FF2B5EF4-FFF2-40B4-BE49-F238E27FC236}">
                 <a16:creationId xmlns:a16="http://schemas.microsoft.com/office/drawing/2014/main" id="{41198B77-23C6-4C9A-92CD-4ACB88F9C9FF}"/>
               </a:ext>
             </a:extLst>
@@ -6339,7 +6394,7 @@
 </p:sld>
 </file>
 
-<file path=ppt/slides/slide12.xml><?xml version="1.0" encoding="utf-8"?>
+<file path=ppt/slides/slide11.xml><?xml version="1.0" encoding="utf-8"?>
 <p:sld xmlns:a="http://schemas.openxmlformats.org/drawingml/2006/main" xmlns:r="http://schemas.openxmlformats.org/officeDocument/2006/relationships" xmlns:p="http://schemas.openxmlformats.org/presentationml/2006/main">
   <p:cSld>
     <p:spTree>
@@ -6413,7 +6468,7 @@
           </p:nvPr>
         </p:nvPicPr>
         <p:blipFill>
-          <a:blip r:embed="rId2">
+          <a:blip r:embed="rId3">
             <a:extLst>
               <a:ext uri="{28A0092B-C50C-407E-A947-70E740481C1C}">
                 <a14:useLocalDpi xmlns:a14="http://schemas.microsoft.com/office/drawing/2010/main" val="0"/>
@@ -6446,7 +6501,7 @@
           <p:nvPr/>
         </p:nvPicPr>
         <p:blipFill>
-          <a:blip r:embed="rId3">
+          <a:blip r:embed="rId4">
             <a:extLst>
               <a:ext uri="{28A0092B-C50C-407E-A947-70E740481C1C}">
                 <a14:useLocalDpi xmlns:a14="http://schemas.microsoft.com/office/drawing/2010/main" val="0"/>
@@ -6480,368 +6535,7 @@
 </p:sld>
 </file>
 
-<file path=ppt/slides/slide13.xml><?xml version="1.0" encoding="utf-8"?>
-<p:sld xmlns:a="http://schemas.openxmlformats.org/drawingml/2006/main" xmlns:r="http://schemas.openxmlformats.org/officeDocument/2006/relationships" xmlns:p="http://schemas.openxmlformats.org/presentationml/2006/main">
-  <p:cSld>
-    <p:spTree>
-      <p:nvGrpSpPr>
-        <p:cNvPr id="1" name=""/>
-        <p:cNvGrpSpPr/>
-        <p:nvPr/>
-      </p:nvGrpSpPr>
-      <p:grpSpPr>
-        <a:xfrm>
-          <a:off x="0" y="0"/>
-          <a:ext cx="0" cy="0"/>
-          <a:chOff x="0" y="0"/>
-          <a:chExt cx="0" cy="0"/>
-        </a:xfrm>
-      </p:grpSpPr>
-      <p:sp>
-        <p:nvSpPr>
-          <p:cNvPr id="2" name="Title 1">
-            <a:extLst>
-              <a:ext uri="{FF2B5EF4-FFF2-40B4-BE49-F238E27FC236}">
-                <a16:creationId xmlns:a16="http://schemas.microsoft.com/office/drawing/2014/main" id="{D4112190-B47C-470F-9F25-6023D45B677C}"/>
-              </a:ext>
-            </a:extLst>
-          </p:cNvPr>
-          <p:cNvSpPr>
-            <a:spLocks noGrp="1"/>
-          </p:cNvSpPr>
-          <p:nvPr>
-            <p:ph type="title"/>
-          </p:nvPr>
-        </p:nvSpPr>
-        <p:spPr/>
-        <p:txBody>
-          <a:bodyPr>
-            <a:normAutofit fontScale="90000"/>
-          </a:bodyPr>
-          <a:lstStyle/>
-          <a:p>
-            <a:r>
-              <a:rPr lang="en-US" dirty="0"/>
-              <a:t>Data </a:t>
-            </a:r>
-            <a:r>
-              <a:rPr lang="en-US" dirty="0" err="1"/>
-              <a:t>AnalysiS</a:t>
-            </a:r>
-            <a:br>
-              <a:rPr lang="en-US" dirty="0"/>
-            </a:br>
-            <a:r>
-              <a:rPr lang="en-US" dirty="0"/>
-              <a:t> BOTTOM 10 SUBURBS BY PROPERTY PRICE</a:t>
-            </a:r>
-            <a:br>
-              <a:rPr lang="en-US" dirty="0"/>
-            </a:br>
-            <a:endParaRPr lang="en-AU" dirty="0"/>
-          </a:p>
-        </p:txBody>
-      </p:sp>
-      <p:pic>
-        <p:nvPicPr>
-          <p:cNvPr id="5" name="Picture 4" descr="Icon&#10;&#10;Description automatically generated">
-            <a:extLst>
-              <a:ext uri="{FF2B5EF4-FFF2-40B4-BE49-F238E27FC236}">
-                <a16:creationId xmlns:a16="http://schemas.microsoft.com/office/drawing/2014/main" id="{2B7A0093-D2F6-4BEF-81F5-DB6DC01B6460}"/>
-              </a:ext>
-            </a:extLst>
-          </p:cNvPr>
-          <p:cNvPicPr>
-            <a:picLocks noChangeAspect="1"/>
-          </p:cNvPicPr>
-          <p:nvPr/>
-        </p:nvPicPr>
-        <p:blipFill>
-          <a:blip r:embed="rId3">
-            <a:extLst>
-              <a:ext uri="{28A0092B-C50C-407E-A947-70E740481C1C}">
-                <a14:useLocalDpi xmlns:a14="http://schemas.microsoft.com/office/drawing/2010/main" val="0"/>
-              </a:ext>
-            </a:extLst>
-          </a:blip>
-          <a:stretch>
-            <a:fillRect/>
-          </a:stretch>
-        </p:blipFill>
-        <p:spPr>
-          <a:xfrm>
-            <a:off x="1059228" y="2750781"/>
-            <a:ext cx="4496000" cy="2987848"/>
-          </a:xfrm>
-          <a:prstGeom prst="rect">
-            <a:avLst/>
-          </a:prstGeom>
-        </p:spPr>
-      </p:pic>
-    </p:spTree>
-    <p:extLst>
-      <p:ext uri="{BB962C8B-B14F-4D97-AF65-F5344CB8AC3E}">
-        <p14:creationId xmlns:p14="http://schemas.microsoft.com/office/powerpoint/2010/main" val="2059596493"/>
-      </p:ext>
-    </p:extLst>
-  </p:cSld>
-  <p:clrMapOvr>
-    <a:masterClrMapping/>
-  </p:clrMapOvr>
-</p:sld>
-</file>
-
-<file path=ppt/slides/slide14.xml><?xml version="1.0" encoding="utf-8"?>
-<p:sld xmlns:a="http://schemas.openxmlformats.org/drawingml/2006/main" xmlns:r="http://schemas.openxmlformats.org/officeDocument/2006/relationships" xmlns:p="http://schemas.openxmlformats.org/presentationml/2006/main">
-  <p:cSld>
-    <p:spTree>
-      <p:nvGrpSpPr>
-        <p:cNvPr id="1" name=""/>
-        <p:cNvGrpSpPr/>
-        <p:nvPr/>
-      </p:nvGrpSpPr>
-      <p:grpSpPr>
-        <a:xfrm>
-          <a:off x="0" y="0"/>
-          <a:ext cx="0" cy="0"/>
-          <a:chOff x="0" y="0"/>
-          <a:chExt cx="0" cy="0"/>
-        </a:xfrm>
-      </p:grpSpPr>
-      <p:sp>
-        <p:nvSpPr>
-          <p:cNvPr id="2" name="Title 1">
-            <a:extLst>
-              <a:ext uri="{FF2B5EF4-FFF2-40B4-BE49-F238E27FC236}">
-                <a16:creationId xmlns:a16="http://schemas.microsoft.com/office/drawing/2014/main" id="{1912BA3D-5E20-4EE3-9166-992A1C66B1BD}"/>
-              </a:ext>
-            </a:extLst>
-          </p:cNvPr>
-          <p:cNvSpPr>
-            <a:spLocks noGrp="1"/>
-          </p:cNvSpPr>
-          <p:nvPr>
-            <p:ph type="title"/>
-          </p:nvPr>
-        </p:nvSpPr>
-        <p:spPr/>
-        <p:txBody>
-          <a:bodyPr>
-            <a:normAutofit fontScale="90000"/>
-          </a:bodyPr>
-          <a:lstStyle/>
-          <a:p>
-            <a:r>
-              <a:rPr lang="en-US" dirty="0"/>
-              <a:t>Data </a:t>
-            </a:r>
-            <a:r>
-              <a:rPr lang="en-US" dirty="0" err="1"/>
-              <a:t>AnalysiS</a:t>
-            </a:r>
-            <a:br>
-              <a:rPr lang="en-US" dirty="0"/>
-            </a:br>
-            <a:r>
-              <a:rPr lang="en-US" dirty="0"/>
-              <a:t> BOTTOM 10 SUBURBS BY PROPERTY PRICE</a:t>
-            </a:r>
-            <a:endParaRPr lang="en-AU" dirty="0"/>
-          </a:p>
-        </p:txBody>
-      </p:sp>
-      <p:pic>
-        <p:nvPicPr>
-          <p:cNvPr id="5" name="Content Placeholder 4" descr="Icon&#10;&#10;Description automatically generated">
-            <a:extLst>
-              <a:ext uri="{FF2B5EF4-FFF2-40B4-BE49-F238E27FC236}">
-                <a16:creationId xmlns:a16="http://schemas.microsoft.com/office/drawing/2014/main" id="{5A98B2EF-8D6D-48BB-8BEE-69925EFE56B4}"/>
-              </a:ext>
-            </a:extLst>
-          </p:cNvPr>
-          <p:cNvPicPr>
-            <a:picLocks noGrp="1" noChangeAspect="1"/>
-          </p:cNvPicPr>
-          <p:nvPr>
-            <p:ph idx="1"/>
-          </p:nvPr>
-        </p:nvPicPr>
-        <p:blipFill>
-          <a:blip r:embed="rId3">
-            <a:extLst>
-              <a:ext uri="{28A0092B-C50C-407E-A947-70E740481C1C}">
-                <a14:useLocalDpi xmlns:a14="http://schemas.microsoft.com/office/drawing/2010/main" val="0"/>
-              </a:ext>
-            </a:extLst>
-          </a:blip>
-          <a:stretch>
-            <a:fillRect/>
-          </a:stretch>
-        </p:blipFill>
-        <p:spPr>
-          <a:xfrm>
-            <a:off x="6741307" y="2569599"/>
-            <a:ext cx="4667734" cy="3101975"/>
-          </a:xfrm>
-        </p:spPr>
-      </p:pic>
-    </p:spTree>
-    <p:extLst>
-      <p:ext uri="{BB962C8B-B14F-4D97-AF65-F5344CB8AC3E}">
-        <p14:creationId xmlns:p14="http://schemas.microsoft.com/office/powerpoint/2010/main" val="681243004"/>
-      </p:ext>
-    </p:extLst>
-  </p:cSld>
-  <p:clrMapOvr>
-    <a:masterClrMapping/>
-  </p:clrMapOvr>
-</p:sld>
-</file>
-
-<file path=ppt/slides/slide15.xml><?xml version="1.0" encoding="utf-8"?>
-<p:sld xmlns:a="http://schemas.openxmlformats.org/drawingml/2006/main" xmlns:r="http://schemas.openxmlformats.org/officeDocument/2006/relationships" xmlns:p="http://schemas.openxmlformats.org/presentationml/2006/main">
-  <p:cSld>
-    <p:spTree>
-      <p:nvGrpSpPr>
-        <p:cNvPr id="1" name=""/>
-        <p:cNvGrpSpPr/>
-        <p:nvPr/>
-      </p:nvGrpSpPr>
-      <p:grpSpPr>
-        <a:xfrm>
-          <a:off x="0" y="0"/>
-          <a:ext cx="0" cy="0"/>
-          <a:chOff x="0" y="0"/>
-          <a:chExt cx="0" cy="0"/>
-        </a:xfrm>
-      </p:grpSpPr>
-      <p:sp>
-        <p:nvSpPr>
-          <p:cNvPr id="2" name="Title 1">
-            <a:extLst>
-              <a:ext uri="{FF2B5EF4-FFF2-40B4-BE49-F238E27FC236}">
-                <a16:creationId xmlns:a16="http://schemas.microsoft.com/office/drawing/2014/main" id="{C2EB7043-B959-4267-9150-EB045B42E519}"/>
-              </a:ext>
-            </a:extLst>
-          </p:cNvPr>
-          <p:cNvSpPr>
-            <a:spLocks noGrp="1"/>
-          </p:cNvSpPr>
-          <p:nvPr>
-            <p:ph type="title"/>
-          </p:nvPr>
-        </p:nvSpPr>
-        <p:spPr/>
-        <p:txBody>
-          <a:bodyPr>
-            <a:normAutofit fontScale="90000"/>
-          </a:bodyPr>
-          <a:lstStyle/>
-          <a:p>
-            <a:r>
-              <a:rPr lang="en-US" dirty="0"/>
-              <a:t>Data </a:t>
-            </a:r>
-            <a:r>
-              <a:rPr lang="en-US" dirty="0" err="1"/>
-              <a:t>AnalysiS</a:t>
-            </a:r>
-            <a:br>
-              <a:rPr lang="en-US" dirty="0"/>
-            </a:br>
-            <a:r>
-              <a:rPr lang="en-US" dirty="0"/>
-              <a:t> BOTTOM 10 SUBURBS BY PROPERTY PRICE</a:t>
-            </a:r>
-            <a:endParaRPr lang="en-AU" dirty="0"/>
-          </a:p>
-        </p:txBody>
-      </p:sp>
-      <p:pic>
-        <p:nvPicPr>
-          <p:cNvPr id="5" name="Content Placeholder 4" descr="Icon&#10;&#10;Description automatically generated">
-            <a:extLst>
-              <a:ext uri="{FF2B5EF4-FFF2-40B4-BE49-F238E27FC236}">
-                <a16:creationId xmlns:a16="http://schemas.microsoft.com/office/drawing/2014/main" id="{118D4FEB-AC0B-4706-9465-5CBB0D8457A8}"/>
-              </a:ext>
-            </a:extLst>
-          </p:cNvPr>
-          <p:cNvPicPr>
-            <a:picLocks noGrp="1" noChangeAspect="1"/>
-          </p:cNvPicPr>
-          <p:nvPr>
-            <p:ph idx="1"/>
-          </p:nvPr>
-        </p:nvPicPr>
-        <p:blipFill>
-          <a:blip r:embed="rId2">
-            <a:extLst>
-              <a:ext uri="{28A0092B-C50C-407E-A947-70E740481C1C}">
-                <a14:useLocalDpi xmlns:a14="http://schemas.microsoft.com/office/drawing/2010/main" val="0"/>
-              </a:ext>
-            </a:extLst>
-          </a:blip>
-          <a:stretch>
-            <a:fillRect/>
-          </a:stretch>
-        </p:blipFill>
-        <p:spPr>
-          <a:xfrm>
-            <a:off x="1052051" y="2707986"/>
-            <a:ext cx="4667734" cy="3101975"/>
-          </a:xfrm>
-        </p:spPr>
-      </p:pic>
-      <p:pic>
-        <p:nvPicPr>
-          <p:cNvPr id="7" name="Picture 6" descr="Icon&#10;&#10;Description automatically generated">
-            <a:extLst>
-              <a:ext uri="{FF2B5EF4-FFF2-40B4-BE49-F238E27FC236}">
-                <a16:creationId xmlns:a16="http://schemas.microsoft.com/office/drawing/2014/main" id="{5FCE27FB-90E8-4EE6-85E9-B7EAFDEB481D}"/>
-              </a:ext>
-            </a:extLst>
-          </p:cNvPr>
-          <p:cNvPicPr>
-            <a:picLocks noChangeAspect="1"/>
-          </p:cNvPicPr>
-          <p:nvPr/>
-        </p:nvPicPr>
-        <p:blipFill>
-          <a:blip r:embed="rId3">
-            <a:extLst>
-              <a:ext uri="{28A0092B-C50C-407E-A947-70E740481C1C}">
-                <a14:useLocalDpi xmlns:a14="http://schemas.microsoft.com/office/drawing/2010/main" val="0"/>
-              </a:ext>
-            </a:extLst>
-          </a:blip>
-          <a:stretch>
-            <a:fillRect/>
-          </a:stretch>
-        </p:blipFill>
-        <p:spPr>
-          <a:xfrm>
-            <a:off x="6351639" y="2667922"/>
-            <a:ext cx="4788310" cy="3182105"/>
-          </a:xfrm>
-          <a:prstGeom prst="rect">
-            <a:avLst/>
-          </a:prstGeom>
-        </p:spPr>
-      </p:pic>
-    </p:spTree>
-    <p:extLst>
-      <p:ext uri="{BB962C8B-B14F-4D97-AF65-F5344CB8AC3E}">
-        <p14:creationId xmlns:p14="http://schemas.microsoft.com/office/powerpoint/2010/main" val="2907969553"/>
-      </p:ext>
-    </p:extLst>
-  </p:cSld>
-  <p:clrMapOvr>
-    <a:masterClrMapping/>
-  </p:clrMapOvr>
-</p:sld>
-</file>
-
-<file path=ppt/slides/slide16.xml><?xml version="1.0" encoding="utf-8"?>
+<file path=ppt/slides/slide12.xml><?xml version="1.0" encoding="utf-8"?>
 <p:sld xmlns:a="http://schemas.openxmlformats.org/drawingml/2006/main" xmlns:r="http://schemas.openxmlformats.org/officeDocument/2006/relationships" xmlns:p="http://schemas.openxmlformats.org/presentationml/2006/main">
   <p:cSld>
     <p:spTree>
@@ -7035,7 +6729,7 @@
 </p:sld>
 </file>
 
-<file path=ppt/slides/slide17.xml><?xml version="1.0" encoding="utf-8"?>
+<file path=ppt/slides/slide13.xml><?xml version="1.0" encoding="utf-8"?>
 <p:sld xmlns:a="http://schemas.openxmlformats.org/drawingml/2006/main" xmlns:r="http://schemas.openxmlformats.org/officeDocument/2006/relationships" xmlns:p="http://schemas.openxmlformats.org/presentationml/2006/main">
   <p:cSld>
     <p:spTree>
@@ -7229,7 +6923,7 @@
 </p:sld>
 </file>
 
-<file path=ppt/slides/slide18.xml><?xml version="1.0" encoding="utf-8"?>
+<file path=ppt/slides/slide14.xml><?xml version="1.0" encoding="utf-8"?>
 <p:sld xmlns:a="http://schemas.openxmlformats.org/drawingml/2006/main" xmlns:r="http://schemas.openxmlformats.org/officeDocument/2006/relationships" xmlns:p="http://schemas.openxmlformats.org/presentationml/2006/main">
   <p:cSld>
     <p:spTree>
@@ -7319,7 +7013,7 @@
 </p:sld>
 </file>
 
-<file path=ppt/slides/slide19.xml><?xml version="1.0" encoding="utf-8"?>
+<file path=ppt/slides/slide15.xml><?xml version="1.0" encoding="utf-8"?>
 <p:sld xmlns:a="http://schemas.openxmlformats.org/drawingml/2006/main" xmlns:r="http://schemas.openxmlformats.org/officeDocument/2006/relationships" xmlns:p="http://schemas.openxmlformats.org/presentationml/2006/main" show="0">
   <p:cSld>
     <p:spTree>
@@ -7500,6 +7194,209 @@
     <p:extLst>
       <p:ext uri="{BB962C8B-B14F-4D97-AF65-F5344CB8AC3E}">
         <p14:creationId xmlns:p14="http://schemas.microsoft.com/office/powerpoint/2010/main" val="4011474787"/>
+      </p:ext>
+    </p:extLst>
+  </p:cSld>
+  <p:clrMapOvr>
+    <a:masterClrMapping/>
+  </p:clrMapOvr>
+</p:sld>
+</file>
+
+<file path=ppt/slides/slide16.xml><?xml version="1.0" encoding="utf-8"?>
+<p:sld xmlns:a="http://schemas.openxmlformats.org/drawingml/2006/main" xmlns:r="http://schemas.openxmlformats.org/officeDocument/2006/relationships" xmlns:p="http://schemas.openxmlformats.org/presentationml/2006/main" show="0">
+  <p:cSld>
+    <p:spTree>
+      <p:nvGrpSpPr>
+        <p:cNvPr id="1" name=""/>
+        <p:cNvGrpSpPr/>
+        <p:nvPr/>
+      </p:nvGrpSpPr>
+      <p:grpSpPr>
+        <a:xfrm>
+          <a:off x="0" y="0"/>
+          <a:ext cx="0" cy="0"/>
+          <a:chOff x="0" y="0"/>
+          <a:chExt cx="0" cy="0"/>
+        </a:xfrm>
+      </p:grpSpPr>
+      <p:sp>
+        <p:nvSpPr>
+          <p:cNvPr id="2" name="Title 1">
+            <a:extLst>
+              <a:ext uri="{FF2B5EF4-FFF2-40B4-BE49-F238E27FC236}">
+                <a16:creationId xmlns:a16="http://schemas.microsoft.com/office/drawing/2014/main" id="{111F2E32-EA5D-4D5A-9751-851D77B11313}"/>
+              </a:ext>
+            </a:extLst>
+          </p:cNvPr>
+          <p:cNvSpPr>
+            <a:spLocks noGrp="1"/>
+          </p:cNvSpPr>
+          <p:nvPr>
+            <p:ph type="title"/>
+          </p:nvPr>
+        </p:nvSpPr>
+        <p:spPr/>
+        <p:txBody>
+          <a:bodyPr/>
+          <a:lstStyle/>
+          <a:p>
+            <a:r>
+              <a:rPr lang="en-AU" dirty="0"/>
+              <a:t>Must Complete for Presentation</a:t>
+            </a:r>
+          </a:p>
+        </p:txBody>
+      </p:sp>
+      <p:sp>
+        <p:nvSpPr>
+          <p:cNvPr id="3" name="Content Placeholder 2">
+            <a:extLst>
+              <a:ext uri="{FF2B5EF4-FFF2-40B4-BE49-F238E27FC236}">
+                <a16:creationId xmlns:a16="http://schemas.microsoft.com/office/drawing/2014/main" id="{A78EBA7C-5C18-4A7B-85EF-BD711BBEF3E2}"/>
+              </a:ext>
+            </a:extLst>
+          </p:cNvPr>
+          <p:cNvSpPr>
+            <a:spLocks noGrp="1"/>
+          </p:cNvSpPr>
+          <p:nvPr>
+            <p:ph idx="1"/>
+          </p:nvPr>
+        </p:nvSpPr>
+        <p:spPr/>
+        <p:txBody>
+          <a:bodyPr>
+            <a:normAutofit fontScale="55000" lnSpcReduction="20000"/>
+          </a:bodyPr>
+          <a:lstStyle/>
+          <a:p>
+            <a:r>
+              <a:rPr lang="en-US" dirty="0"/>
+              <a:t>The presentation requirements for Project 1 are as follows.</a:t>
+            </a:r>
+          </a:p>
+          <a:p>
+            <a:r>
+              <a:rPr lang="en-US" dirty="0"/>
+              <a:t>Your presentation must:</a:t>
+            </a:r>
+          </a:p>
+          <a:p>
+            <a:pPr>
+              <a:buFont typeface="Arial" panose="020B0604020202020204" pitchFamily="34" charset="0"/>
+              <a:buChar char="•"/>
+            </a:pPr>
+            <a:r>
+              <a:rPr lang="en-US" dirty="0"/>
+              <a:t>Be at least 8-10 min. long</a:t>
+            </a:r>
+          </a:p>
+          <a:p>
+            <a:pPr>
+              <a:buFont typeface="Arial" panose="020B0604020202020204" pitchFamily="34" charset="0"/>
+              <a:buChar char="•"/>
+            </a:pPr>
+            <a:r>
+              <a:rPr lang="en-US" dirty="0"/>
+              <a:t>Describe the core message or hypothesis for your project.</a:t>
+            </a:r>
+          </a:p>
+          <a:p>
+            <a:pPr>
+              <a:buFont typeface="Arial" panose="020B0604020202020204" pitchFamily="34" charset="0"/>
+              <a:buChar char="•"/>
+            </a:pPr>
+            <a:r>
+              <a:rPr lang="en-US" dirty="0"/>
+              <a:t>Describe the questions you and your group found interesting, and what motivated you to answer them</a:t>
+            </a:r>
+          </a:p>
+          <a:p>
+            <a:pPr>
+              <a:buFont typeface="Arial" panose="020B0604020202020204" pitchFamily="34" charset="0"/>
+              <a:buChar char="•"/>
+            </a:pPr>
+            <a:r>
+              <a:rPr lang="en-US" dirty="0"/>
+              <a:t>Summarize where and how you found the data you used to answer these questions</a:t>
+            </a:r>
+          </a:p>
+          <a:p>
+            <a:pPr>
+              <a:buFont typeface="Arial" panose="020B0604020202020204" pitchFamily="34" charset="0"/>
+              <a:buChar char="•"/>
+            </a:pPr>
+            <a:r>
+              <a:rPr lang="en-US" dirty="0"/>
+              <a:t>Describe the data exploration and cleanup process (accompanied by your </a:t>
+            </a:r>
+            <a:r>
+              <a:rPr lang="en-US" dirty="0" err="1"/>
+              <a:t>Jupyter</a:t>
+            </a:r>
+            <a:r>
+              <a:rPr lang="en-US" dirty="0"/>
+              <a:t> Notebook)</a:t>
+            </a:r>
+          </a:p>
+          <a:p>
+            <a:pPr>
+              <a:buFont typeface="Arial" panose="020B0604020202020204" pitchFamily="34" charset="0"/>
+              <a:buChar char="•"/>
+            </a:pPr>
+            <a:r>
+              <a:rPr lang="en-US" dirty="0"/>
+              <a:t>Describe the analysis process (accompanied by your </a:t>
+            </a:r>
+            <a:r>
+              <a:rPr lang="en-US" dirty="0" err="1"/>
+              <a:t>Jupyter</a:t>
+            </a:r>
+            <a:r>
+              <a:rPr lang="en-US" dirty="0"/>
+              <a:t> Notebook)</a:t>
+            </a:r>
+          </a:p>
+          <a:p>
+            <a:pPr>
+              <a:buFont typeface="Arial" panose="020B0604020202020204" pitchFamily="34" charset="0"/>
+              <a:buChar char="•"/>
+            </a:pPr>
+            <a:r>
+              <a:rPr lang="en-US" dirty="0"/>
+              <a:t>Summarize your conclusions. This should include a numerical summary (i.e., what data did your analysis yield), as well as visualizations of that summary (plots of the final analysis data)</a:t>
+            </a:r>
+          </a:p>
+          <a:p>
+            <a:pPr>
+              <a:buFont typeface="Arial" panose="020B0604020202020204" pitchFamily="34" charset="0"/>
+              <a:buChar char="•"/>
+            </a:pPr>
+            <a:r>
+              <a:rPr lang="en-US" dirty="0"/>
+              <a:t>Discuss the implications of your findings. This is where you get to have an open-ended discussion about what your findings "mean".</a:t>
+            </a:r>
+          </a:p>
+          <a:p>
+            <a:pPr>
+              <a:buFont typeface="Arial" panose="020B0604020202020204" pitchFamily="34" charset="0"/>
+              <a:buChar char="•"/>
+            </a:pPr>
+            <a:r>
+              <a:rPr lang="en-US" dirty="0"/>
+              <a:t>Tell a good story! Storytelling through data analysis is no different than in literature. Find your narrative and use your analysis and visualization skills to highlight conflict and resolution in your data.</a:t>
+            </a:r>
+          </a:p>
+          <a:p>
+            <a:endParaRPr lang="en-AU" dirty="0"/>
+          </a:p>
+        </p:txBody>
+      </p:sp>
+    </p:spTree>
+    <p:extLst>
+      <p:ext uri="{BB962C8B-B14F-4D97-AF65-F5344CB8AC3E}">
+        <p14:creationId xmlns:p14="http://schemas.microsoft.com/office/powerpoint/2010/main" val="220314126"/>
       </p:ext>
     </p:extLst>
   </p:cSld>
@@ -7732,209 +7629,6 @@
 </p:sld>
 </file>
 
-<file path=ppt/slides/slide20.xml><?xml version="1.0" encoding="utf-8"?>
-<p:sld xmlns:a="http://schemas.openxmlformats.org/drawingml/2006/main" xmlns:r="http://schemas.openxmlformats.org/officeDocument/2006/relationships" xmlns:p="http://schemas.openxmlformats.org/presentationml/2006/main" show="0">
-  <p:cSld>
-    <p:spTree>
-      <p:nvGrpSpPr>
-        <p:cNvPr id="1" name=""/>
-        <p:cNvGrpSpPr/>
-        <p:nvPr/>
-      </p:nvGrpSpPr>
-      <p:grpSpPr>
-        <a:xfrm>
-          <a:off x="0" y="0"/>
-          <a:ext cx="0" cy="0"/>
-          <a:chOff x="0" y="0"/>
-          <a:chExt cx="0" cy="0"/>
-        </a:xfrm>
-      </p:grpSpPr>
-      <p:sp>
-        <p:nvSpPr>
-          <p:cNvPr id="2" name="Title 1">
-            <a:extLst>
-              <a:ext uri="{FF2B5EF4-FFF2-40B4-BE49-F238E27FC236}">
-                <a16:creationId xmlns:a16="http://schemas.microsoft.com/office/drawing/2014/main" id="{111F2E32-EA5D-4D5A-9751-851D77B11313}"/>
-              </a:ext>
-            </a:extLst>
-          </p:cNvPr>
-          <p:cNvSpPr>
-            <a:spLocks noGrp="1"/>
-          </p:cNvSpPr>
-          <p:nvPr>
-            <p:ph type="title"/>
-          </p:nvPr>
-        </p:nvSpPr>
-        <p:spPr/>
-        <p:txBody>
-          <a:bodyPr/>
-          <a:lstStyle/>
-          <a:p>
-            <a:r>
-              <a:rPr lang="en-AU" dirty="0"/>
-              <a:t>Must Complete for Presentation</a:t>
-            </a:r>
-          </a:p>
-        </p:txBody>
-      </p:sp>
-      <p:sp>
-        <p:nvSpPr>
-          <p:cNvPr id="3" name="Content Placeholder 2">
-            <a:extLst>
-              <a:ext uri="{FF2B5EF4-FFF2-40B4-BE49-F238E27FC236}">
-                <a16:creationId xmlns:a16="http://schemas.microsoft.com/office/drawing/2014/main" id="{A78EBA7C-5C18-4A7B-85EF-BD711BBEF3E2}"/>
-              </a:ext>
-            </a:extLst>
-          </p:cNvPr>
-          <p:cNvSpPr>
-            <a:spLocks noGrp="1"/>
-          </p:cNvSpPr>
-          <p:nvPr>
-            <p:ph idx="1"/>
-          </p:nvPr>
-        </p:nvSpPr>
-        <p:spPr/>
-        <p:txBody>
-          <a:bodyPr>
-            <a:normAutofit fontScale="55000" lnSpcReduction="20000"/>
-          </a:bodyPr>
-          <a:lstStyle/>
-          <a:p>
-            <a:r>
-              <a:rPr lang="en-US" dirty="0"/>
-              <a:t>The presentation requirements for Project 1 are as follows.</a:t>
-            </a:r>
-          </a:p>
-          <a:p>
-            <a:r>
-              <a:rPr lang="en-US" dirty="0"/>
-              <a:t>Your presentation must:</a:t>
-            </a:r>
-          </a:p>
-          <a:p>
-            <a:pPr>
-              <a:buFont typeface="Arial" panose="020B0604020202020204" pitchFamily="34" charset="0"/>
-              <a:buChar char="•"/>
-            </a:pPr>
-            <a:r>
-              <a:rPr lang="en-US" dirty="0"/>
-              <a:t>Be at least 8-10 min. long</a:t>
-            </a:r>
-          </a:p>
-          <a:p>
-            <a:pPr>
-              <a:buFont typeface="Arial" panose="020B0604020202020204" pitchFamily="34" charset="0"/>
-              <a:buChar char="•"/>
-            </a:pPr>
-            <a:r>
-              <a:rPr lang="en-US" dirty="0"/>
-              <a:t>Describe the core message or hypothesis for your project.</a:t>
-            </a:r>
-          </a:p>
-          <a:p>
-            <a:pPr>
-              <a:buFont typeface="Arial" panose="020B0604020202020204" pitchFamily="34" charset="0"/>
-              <a:buChar char="•"/>
-            </a:pPr>
-            <a:r>
-              <a:rPr lang="en-US" dirty="0"/>
-              <a:t>Describe the questions you and your group found interesting, and what motivated you to answer them</a:t>
-            </a:r>
-          </a:p>
-          <a:p>
-            <a:pPr>
-              <a:buFont typeface="Arial" panose="020B0604020202020204" pitchFamily="34" charset="0"/>
-              <a:buChar char="•"/>
-            </a:pPr>
-            <a:r>
-              <a:rPr lang="en-US" dirty="0"/>
-              <a:t>Summarize where and how you found the data you used to answer these questions</a:t>
-            </a:r>
-          </a:p>
-          <a:p>
-            <a:pPr>
-              <a:buFont typeface="Arial" panose="020B0604020202020204" pitchFamily="34" charset="0"/>
-              <a:buChar char="•"/>
-            </a:pPr>
-            <a:r>
-              <a:rPr lang="en-US" dirty="0"/>
-              <a:t>Describe the data exploration and cleanup process (accompanied by your </a:t>
-            </a:r>
-            <a:r>
-              <a:rPr lang="en-US" dirty="0" err="1"/>
-              <a:t>Jupyter</a:t>
-            </a:r>
-            <a:r>
-              <a:rPr lang="en-US" dirty="0"/>
-              <a:t> Notebook)</a:t>
-            </a:r>
-          </a:p>
-          <a:p>
-            <a:pPr>
-              <a:buFont typeface="Arial" panose="020B0604020202020204" pitchFamily="34" charset="0"/>
-              <a:buChar char="•"/>
-            </a:pPr>
-            <a:r>
-              <a:rPr lang="en-US" dirty="0"/>
-              <a:t>Describe the analysis process (accompanied by your </a:t>
-            </a:r>
-            <a:r>
-              <a:rPr lang="en-US" dirty="0" err="1"/>
-              <a:t>Jupyter</a:t>
-            </a:r>
-            <a:r>
-              <a:rPr lang="en-US" dirty="0"/>
-              <a:t> Notebook)</a:t>
-            </a:r>
-          </a:p>
-          <a:p>
-            <a:pPr>
-              <a:buFont typeface="Arial" panose="020B0604020202020204" pitchFamily="34" charset="0"/>
-              <a:buChar char="•"/>
-            </a:pPr>
-            <a:r>
-              <a:rPr lang="en-US" dirty="0"/>
-              <a:t>Summarize your conclusions. This should include a numerical summary (i.e., what data did your analysis yield), as well as visualizations of that summary (plots of the final analysis data)</a:t>
-            </a:r>
-          </a:p>
-          <a:p>
-            <a:pPr>
-              <a:buFont typeface="Arial" panose="020B0604020202020204" pitchFamily="34" charset="0"/>
-              <a:buChar char="•"/>
-            </a:pPr>
-            <a:r>
-              <a:rPr lang="en-US" dirty="0"/>
-              <a:t>Discuss the implications of your findings. This is where you get to have an open-ended discussion about what your findings "mean".</a:t>
-            </a:r>
-          </a:p>
-          <a:p>
-            <a:pPr>
-              <a:buFont typeface="Arial" panose="020B0604020202020204" pitchFamily="34" charset="0"/>
-              <a:buChar char="•"/>
-            </a:pPr>
-            <a:r>
-              <a:rPr lang="en-US" dirty="0"/>
-              <a:t>Tell a good story! Storytelling through data analysis is no different than in literature. Find your narrative and use your analysis and visualization skills to highlight conflict and resolution in your data.</a:t>
-            </a:r>
-          </a:p>
-          <a:p>
-            <a:endParaRPr lang="en-AU" dirty="0"/>
-          </a:p>
-        </p:txBody>
-      </p:sp>
-    </p:spTree>
-    <p:extLst>
-      <p:ext uri="{BB962C8B-B14F-4D97-AF65-F5344CB8AC3E}">
-        <p14:creationId xmlns:p14="http://schemas.microsoft.com/office/powerpoint/2010/main" val="220314126"/>
-      </p:ext>
-    </p:extLst>
-  </p:cSld>
-  <p:clrMapOvr>
-    <a:masterClrMapping/>
-  </p:clrMapOvr>
-</p:sld>
-</file>
-
 <file path=ppt/slides/slide3.xml><?xml version="1.0" encoding="utf-8"?>
 <p:sld xmlns:a="http://schemas.openxmlformats.org/drawingml/2006/main" xmlns:r="http://schemas.openxmlformats.org/officeDocument/2006/relationships" xmlns:p="http://schemas.openxmlformats.org/presentationml/2006/main">
   <p:cSld>
@@ -8248,7 +7942,7 @@
             <a:pPr lvl="1"/>
             <a:r>
               <a:rPr lang="en-AU" dirty="0"/>
-              <a:t>These categories were believed to have the most impact on the hypothesis, directly effecting house price.  Categories overlooked we more related to commercial property and petty crime</a:t>
+              <a:t>These categories were believed to have the most impact on the hypothesis, directly affecting house price.  Categories overlooked were more related to commercial property and petty crime</a:t>
             </a:r>
           </a:p>
         </p:txBody>
@@ -8399,7 +8093,7 @@
                   <a:schemeClr val="tx1"/>
                 </a:solidFill>
               </a:rPr>
-              <a:t>In order to determine if there is a correlation between crime counts and property prices,  one property price value was used for each financial year. This was was the mean of the four quarterly prices of each financial year</a:t>
+              <a:t>In order to determine if there is a correlation between crime counts and property prices,  one property price value was used for each financial year. This was the mean of the four quarterly prices of each financial year</a:t>
             </a:r>
           </a:p>
           <a:p>
@@ -8809,7 +8503,7 @@
           </p:nvPr>
         </p:nvPicPr>
         <p:blipFill>
-          <a:blip r:embed="rId2">
+          <a:blip r:embed="rId3">
             <a:extLst>
               <a:ext uri="{28A0092B-C50C-407E-A947-70E740481C1C}">
                 <a14:useLocalDpi xmlns:a14="http://schemas.microsoft.com/office/drawing/2010/main" val="0"/>
@@ -8842,7 +8536,7 @@
           <p:nvPr/>
         </p:nvPicPr>
         <p:blipFill>
-          <a:blip r:embed="rId3">
+          <a:blip r:embed="rId4">
             <a:extLst>
               <a:ext uri="{28A0092B-C50C-407E-A947-70E740481C1C}">
                 <a14:useLocalDpi xmlns:a14="http://schemas.microsoft.com/office/drawing/2010/main" val="0"/>
@@ -8950,7 +8644,7 @@
           </p:nvPr>
         </p:nvPicPr>
         <p:blipFill>
-          <a:blip r:embed="rId2">
+          <a:blip r:embed="rId3">
             <a:extLst>
               <a:ext uri="{28A0092B-C50C-407E-A947-70E740481C1C}">
                 <a14:useLocalDpi xmlns:a14="http://schemas.microsoft.com/office/drawing/2010/main" val="0"/>
@@ -8983,7 +8677,7 @@
           <p:nvPr/>
         </p:nvPicPr>
         <p:blipFill>
-          <a:blip r:embed="rId3">
+          <a:blip r:embed="rId4">
             <a:extLst>
               <a:ext uri="{28A0092B-C50C-407E-A947-70E740481C1C}">
                 <a14:useLocalDpi xmlns:a14="http://schemas.microsoft.com/office/drawing/2010/main" val="0"/>
@@ -9070,7 +8764,7 @@
             </a:br>
             <a:r>
               <a:rPr lang="en-US" dirty="0"/>
-              <a:t> BOTTOM 10 SUBURBS BY CRIME COUNT</a:t>
+              <a:t> TOP 10 SUBURBS BY PROPERTY PRICE</a:t>
             </a:r>
             <a:br>
               <a:rPr lang="en-US" dirty="0"/>
@@ -9079,45 +8773,45 @@
           </a:p>
         </p:txBody>
       </p:sp>
-      <p:sp>
-        <p:nvSpPr>
-          <p:cNvPr id="3" name="Content Placeholder 2">
+      <p:pic>
+        <p:nvPicPr>
+          <p:cNvPr id="5" name="Content Placeholder 4" descr="Icon&#10;&#10;Description automatically generated">
             <a:extLst>
               <a:ext uri="{FF2B5EF4-FFF2-40B4-BE49-F238E27FC236}">
-                <a16:creationId xmlns:a16="http://schemas.microsoft.com/office/drawing/2014/main" id="{9DE61BC1-0CFD-4085-B545-1FDE0510523F}"/>
+                <a16:creationId xmlns:a16="http://schemas.microsoft.com/office/drawing/2014/main" id="{8C3E7055-D6FF-4E94-8DBD-D142F3407FF2}"/>
               </a:ext>
             </a:extLst>
           </p:cNvPr>
-          <p:cNvSpPr>
-            <a:spLocks noGrp="1"/>
-          </p:cNvSpPr>
+          <p:cNvPicPr>
+            <a:picLocks noGrp="1" noChangeAspect="1"/>
+          </p:cNvPicPr>
           <p:nvPr>
             <p:ph idx="1"/>
           </p:nvPr>
-        </p:nvSpPr>
-        <p:spPr/>
-        <p:txBody>
-          <a:bodyPr/>
-          <a:lstStyle/>
-          <a:p>
-            <a:r>
-              <a:rPr lang="en-AU" dirty="0"/>
-              <a:t>No graph or bottom 10 as there are an excessive number of locations with just one (1) crime for the period of time.  To be able to define the bottom 10 suburbs by crime count other variables would need to be considered</a:t>
-            </a:r>
-          </a:p>
-          <a:p>
-            <a:endParaRPr lang="en-AU" dirty="0">
-              <a:solidFill>
-                <a:srgbClr val="FF0000"/>
-              </a:solidFill>
-            </a:endParaRPr>
-          </a:p>
-        </p:txBody>
-      </p:sp>
+        </p:nvPicPr>
+        <p:blipFill>
+          <a:blip r:embed="rId3">
+            <a:extLst>
+              <a:ext uri="{28A0092B-C50C-407E-A947-70E740481C1C}">
+                <a14:useLocalDpi xmlns:a14="http://schemas.microsoft.com/office/drawing/2010/main" val="0"/>
+              </a:ext>
+            </a:extLst>
+          </a:blip>
+          <a:stretch>
+            <a:fillRect/>
+          </a:stretch>
+        </p:blipFill>
+        <p:spPr>
+          <a:xfrm>
+            <a:off x="1137510" y="2795469"/>
+            <a:ext cx="4542500" cy="3097837"/>
+          </a:xfrm>
+        </p:spPr>
+      </p:pic>
     </p:spTree>
     <p:extLst>
       <p:ext uri="{BB962C8B-B14F-4D97-AF65-F5344CB8AC3E}">
-        <p14:creationId xmlns:p14="http://schemas.microsoft.com/office/powerpoint/2010/main" val="117376051"/>
+        <p14:creationId xmlns:p14="http://schemas.microsoft.com/office/powerpoint/2010/main" val="3150616333"/>
       </p:ext>
     </p:extLst>
   </p:cSld>

</xml_diff>

<commit_message>
Update After Zoom Meeting
</commit_message>
<xml_diff>
--- a/Project 1 Presentation.pptx
+++ b/Project 1 Presentation.pptx
@@ -5,7 +5,7 @@
     <p:sldMasterId id="2147483713" r:id="rId1"/>
   </p:sldMasterIdLst>
   <p:notesMasterIdLst>
-    <p:notesMasterId r:id="rId20"/>
+    <p:notesMasterId r:id="rId19"/>
   </p:notesMasterIdLst>
   <p:sldIdLst>
     <p:sldId id="256" r:id="rId2"/>
@@ -13,19 +13,18 @@
     <p:sldId id="281" r:id="rId4"/>
     <p:sldId id="282" r:id="rId5"/>
     <p:sldId id="267" r:id="rId6"/>
-    <p:sldId id="283" r:id="rId7"/>
-    <p:sldId id="277" r:id="rId8"/>
-    <p:sldId id="278" r:id="rId9"/>
-    <p:sldId id="279" r:id="rId10"/>
-    <p:sldId id="284" r:id="rId11"/>
-    <p:sldId id="285" r:id="rId12"/>
-    <p:sldId id="286" r:id="rId13"/>
-    <p:sldId id="275" r:id="rId14"/>
-    <p:sldId id="276" r:id="rId15"/>
-    <p:sldId id="287" r:id="rId16"/>
-    <p:sldId id="263" r:id="rId17"/>
-    <p:sldId id="264" r:id="rId18"/>
-    <p:sldId id="265" r:id="rId19"/>
+    <p:sldId id="277" r:id="rId7"/>
+    <p:sldId id="278" r:id="rId8"/>
+    <p:sldId id="279" r:id="rId9"/>
+    <p:sldId id="284" r:id="rId10"/>
+    <p:sldId id="285" r:id="rId11"/>
+    <p:sldId id="286" r:id="rId12"/>
+    <p:sldId id="275" r:id="rId13"/>
+    <p:sldId id="276" r:id="rId14"/>
+    <p:sldId id="287" r:id="rId15"/>
+    <p:sldId id="263" r:id="rId16"/>
+    <p:sldId id="264" r:id="rId17"/>
+    <p:sldId id="265" r:id="rId18"/>
   </p:sldIdLst>
   <p:sldSz cx="12192000" cy="6858000"/>
   <p:notesSz cx="6858000" cy="9144000"/>
@@ -617,43 +616,18 @@
           <a:lstStyle/>
           <a:p>
             <a:r>
-              <a:rPr lang="en-AU" dirty="0">
-                <a:solidFill>
-                  <a:srgbClr val="FF0000"/>
-                </a:solidFill>
-              </a:rPr>
+              <a:rPr lang="en-AU" dirty="0"/>
               <a:t>Miki</a:t>
             </a:r>
           </a:p>
           <a:p>
-            <a:endParaRPr lang="en-AU" dirty="0">
-              <a:solidFill>
-                <a:srgbClr val="FF0000"/>
-              </a:solidFill>
-            </a:endParaRPr>
-          </a:p>
-          <a:p>
-            <a:r>
-              <a:rPr lang="en-AU" dirty="0">
-                <a:solidFill>
-                  <a:srgbClr val="FF0000"/>
-                </a:solidFill>
-              </a:rPr>
-              <a:t>Insert graphs</a:t>
-            </a:r>
-          </a:p>
-          <a:p>
-            <a:r>
-              <a:rPr lang="en-AU" dirty="0">
-                <a:solidFill>
-                  <a:srgbClr val="FF0000"/>
-                </a:solidFill>
-              </a:rPr>
-              <a:t>Insert insights – list suburbs that are in the top 10 over the past five financial years</a:t>
-            </a:r>
-          </a:p>
-          <a:p>
             <a:endParaRPr lang="en-AU" dirty="0"/>
+          </a:p>
+          <a:p>
+            <a:r>
+              <a:rPr lang="en-AU" dirty="0"/>
+              <a:t>Missing 2016 -2017 chart</a:t>
+            </a:r>
           </a:p>
         </p:txBody>
       </p:sp>
@@ -683,7 +657,7 @@
     </p:spTree>
     <p:extLst>
       <p:ext uri="{BB962C8B-B14F-4D97-AF65-F5344CB8AC3E}">
-        <p14:creationId xmlns:p14="http://schemas.microsoft.com/office/powerpoint/2010/main" val="4101713849"/>
+        <p14:creationId xmlns:p14="http://schemas.microsoft.com/office/powerpoint/2010/main" val="1461187036"/>
       </p:ext>
     </p:extLst>
   </p:cSld>
@@ -738,17 +712,8 @@
           <a:lstStyle/>
           <a:p>
             <a:r>
-              <a:rPr lang="en-AU" dirty="0"/>
+              <a:rPr lang="en-US" dirty="0"/>
               <a:t>Miki</a:t>
-            </a:r>
-          </a:p>
-          <a:p>
-            <a:endParaRPr lang="en-AU" dirty="0"/>
-          </a:p>
-          <a:p>
-            <a:r>
-              <a:rPr lang="en-AU" dirty="0"/>
-              <a:t>Missing 2016 -2017 chart</a:t>
             </a:r>
           </a:p>
         </p:txBody>
@@ -779,7 +744,7 @@
     </p:spTree>
     <p:extLst>
       <p:ext uri="{BB962C8B-B14F-4D97-AF65-F5344CB8AC3E}">
-        <p14:creationId xmlns:p14="http://schemas.microsoft.com/office/powerpoint/2010/main" val="1461187036"/>
+        <p14:creationId xmlns:p14="http://schemas.microsoft.com/office/powerpoint/2010/main" val="1575001064"/>
       </p:ext>
     </p:extLst>
   </p:cSld>
@@ -866,7 +831,7 @@
     </p:spTree>
     <p:extLst>
       <p:ext uri="{BB962C8B-B14F-4D97-AF65-F5344CB8AC3E}">
-        <p14:creationId xmlns:p14="http://schemas.microsoft.com/office/powerpoint/2010/main" val="1575001064"/>
+        <p14:creationId xmlns:p14="http://schemas.microsoft.com/office/powerpoint/2010/main" val="3934458469"/>
       </p:ext>
     </p:extLst>
   </p:cSld>
@@ -922,8 +887,11 @@
           <a:p>
             <a:r>
               <a:rPr lang="en-US" dirty="0"/>
-              <a:t>Miki</a:t>
-            </a:r>
+              <a:t>Nick</a:t>
+            </a:r>
+          </a:p>
+          <a:p>
+            <a:endParaRPr lang="en-US" dirty="0"/>
           </a:p>
         </p:txBody>
       </p:sp>
@@ -953,7 +921,7 @@
     </p:spTree>
     <p:extLst>
       <p:ext uri="{BB962C8B-B14F-4D97-AF65-F5344CB8AC3E}">
-        <p14:creationId xmlns:p14="http://schemas.microsoft.com/office/powerpoint/2010/main" val="3934458469"/>
+        <p14:creationId xmlns:p14="http://schemas.microsoft.com/office/powerpoint/2010/main" val="336626188"/>
       </p:ext>
     </p:extLst>
   </p:cSld>
@@ -1008,12 +976,19 @@
           <a:lstStyle/>
           <a:p>
             <a:r>
-              <a:rPr lang="en-US" dirty="0"/>
-              <a:t>Nick</a:t>
-            </a:r>
-          </a:p>
-          <a:p>
-            <a:endParaRPr lang="en-US" dirty="0"/>
+              <a:rPr lang="en-US" dirty="0" err="1"/>
+              <a:t>Presit</a:t>
+            </a:r>
+            <a:r>
+              <a:rPr lang="en-US" dirty="0"/>
+              <a:t> – Challenges </a:t>
+            </a:r>
+          </a:p>
+          <a:p>
+            <a:r>
+              <a:rPr lang="en-US" dirty="0"/>
+              <a:t>Nick – Additional project time</a:t>
+            </a:r>
           </a:p>
         </p:txBody>
       </p:sp>
@@ -1043,7 +1018,7 @@
     </p:spTree>
     <p:extLst>
       <p:ext uri="{BB962C8B-B14F-4D97-AF65-F5344CB8AC3E}">
-        <p14:creationId xmlns:p14="http://schemas.microsoft.com/office/powerpoint/2010/main" val="336626188"/>
+        <p14:creationId xmlns:p14="http://schemas.microsoft.com/office/powerpoint/2010/main" val="2023778032"/>
       </p:ext>
     </p:extLst>
   </p:cSld>
@@ -1097,20 +1072,7 @@
           <a:bodyPr/>
           <a:lstStyle/>
           <a:p>
-            <a:r>
-              <a:rPr lang="en-US" dirty="0" err="1"/>
-              <a:t>Presit</a:t>
-            </a:r>
-            <a:r>
-              <a:rPr lang="en-US" dirty="0"/>
-              <a:t> – Challenges </a:t>
-            </a:r>
-          </a:p>
-          <a:p>
-            <a:r>
-              <a:rPr lang="en-US" dirty="0"/>
-              <a:t>Nick – Additional project time</a:t>
-            </a:r>
+            <a:endParaRPr lang="en-AU"/>
           </a:p>
         </p:txBody>
       </p:sp>
@@ -1132,90 +1094,6 @@
             <a:fld id="{4F2AAB9E-B1B6-7347-AEB9-3DE8A4E8C48F}" type="slidenum">
               <a:rPr lang="en-US" smtClean="0"/>
               <a:t>15</a:t>
-            </a:fld>
-            <a:endParaRPr lang="en-US"/>
-          </a:p>
-        </p:txBody>
-      </p:sp>
-    </p:spTree>
-    <p:extLst>
-      <p:ext uri="{BB962C8B-B14F-4D97-AF65-F5344CB8AC3E}">
-        <p14:creationId xmlns:p14="http://schemas.microsoft.com/office/powerpoint/2010/main" val="2023778032"/>
-      </p:ext>
-    </p:extLst>
-  </p:cSld>
-  <p:clrMapOvr>
-    <a:masterClrMapping/>
-  </p:clrMapOvr>
-</p:notes>
-</file>
-
-<file path=ppt/notesSlides/notesSlide16.xml><?xml version="1.0" encoding="utf-8"?>
-<p:notes xmlns:a="http://schemas.openxmlformats.org/drawingml/2006/main" xmlns:r="http://schemas.openxmlformats.org/officeDocument/2006/relationships" xmlns:p="http://schemas.openxmlformats.org/presentationml/2006/main">
-  <p:cSld>
-    <p:spTree>
-      <p:nvGrpSpPr>
-        <p:cNvPr id="1" name=""/>
-        <p:cNvGrpSpPr/>
-        <p:nvPr/>
-      </p:nvGrpSpPr>
-      <p:grpSpPr>
-        <a:xfrm>
-          <a:off x="0" y="0"/>
-          <a:ext cx="0" cy="0"/>
-          <a:chOff x="0" y="0"/>
-          <a:chExt cx="0" cy="0"/>
-        </a:xfrm>
-      </p:grpSpPr>
-      <p:sp>
-        <p:nvSpPr>
-          <p:cNvPr id="2" name="Slide Image Placeholder 1"/>
-          <p:cNvSpPr>
-            <a:spLocks noGrp="1" noRot="1" noChangeAspect="1"/>
-          </p:cNvSpPr>
-          <p:nvPr>
-            <p:ph type="sldImg"/>
-          </p:nvPr>
-        </p:nvSpPr>
-        <p:spPr/>
-      </p:sp>
-      <p:sp>
-        <p:nvSpPr>
-          <p:cNvPr id="3" name="Notes Placeholder 2"/>
-          <p:cNvSpPr>
-            <a:spLocks noGrp="1"/>
-          </p:cNvSpPr>
-          <p:nvPr>
-            <p:ph type="body" idx="1"/>
-          </p:nvPr>
-        </p:nvSpPr>
-        <p:spPr/>
-        <p:txBody>
-          <a:bodyPr/>
-          <a:lstStyle/>
-          <a:p>
-            <a:endParaRPr lang="en-AU"/>
-          </a:p>
-        </p:txBody>
-      </p:sp>
-      <p:sp>
-        <p:nvSpPr>
-          <p:cNvPr id="4" name="Slide Number Placeholder 3"/>
-          <p:cNvSpPr>
-            <a:spLocks noGrp="1"/>
-          </p:cNvSpPr>
-          <p:nvPr>
-            <p:ph type="sldNum" sz="quarter" idx="5"/>
-          </p:nvPr>
-        </p:nvSpPr>
-        <p:spPr/>
-        <p:txBody>
-          <a:bodyPr/>
-          <a:lstStyle/>
-          <a:p>
-            <a:fld id="{4F2AAB9E-B1B6-7347-AEB9-3DE8A4E8C48F}" type="slidenum">
-              <a:rPr lang="en-US" smtClean="0"/>
-              <a:t>16</a:t>
             </a:fld>
             <a:endParaRPr lang="en-US"/>
           </a:p>
@@ -2432,90 +2310,96 @@
           <a:bodyPr/>
           <a:lstStyle/>
           <a:p>
-            <a:pPr marL="0" marR="0" lvl="0" indent="0" algn="l" defTabSz="914400" rtl="0" eaLnBrk="1" fontAlgn="auto" latinLnBrk="0" hangingPunct="1">
-              <a:lnSpc>
-                <a:spcPct val="100000"/>
-              </a:lnSpc>
-              <a:spcBef>
-                <a:spcPts val="0"/>
-              </a:spcBef>
-              <a:spcAft>
-                <a:spcPts val="0"/>
-              </a:spcAft>
-              <a:buClrTx/>
-              <a:buSzTx/>
-              <a:buFontTx/>
-              <a:buNone/>
-              <a:tabLst/>
-              <a:defRPr/>
-            </a:pPr>
-            <a:r>
-              <a:rPr lang="en-US" dirty="0"/>
-              <a:t>One excel document per quarter, a lot of data to merge</a:t>
-            </a:r>
-          </a:p>
-          <a:p>
-            <a:pPr marL="0" marR="0" lvl="0" indent="0" algn="l" defTabSz="914400" rtl="0" eaLnBrk="1" fontAlgn="auto" latinLnBrk="0" hangingPunct="1">
-              <a:lnSpc>
-                <a:spcPct val="100000"/>
-              </a:lnSpc>
-              <a:spcBef>
-                <a:spcPts val="0"/>
-              </a:spcBef>
-              <a:spcAft>
-                <a:spcPts val="0"/>
-              </a:spcAft>
-              <a:buClrTx/>
-              <a:buSzTx/>
-              <a:buFontTx/>
-              <a:buNone/>
-              <a:tabLst/>
-              <a:defRPr/>
-            </a:pPr>
-            <a:r>
-              <a:rPr lang="en-US" dirty="0"/>
-              <a:t>Lots of </a:t>
-            </a:r>
-            <a:r>
-              <a:rPr lang="en-US" dirty="0" err="1"/>
-              <a:t>NaN</a:t>
-            </a:r>
-            <a:r>
-              <a:rPr lang="en-US" dirty="0"/>
-              <a:t> in the combining of the data due to quarterly data – Median</a:t>
-            </a:r>
-          </a:p>
-          <a:p>
-            <a:pPr marL="0" marR="0" lvl="0" indent="0" algn="l" defTabSz="914400" rtl="0" eaLnBrk="1" fontAlgn="auto" latinLnBrk="0" hangingPunct="1">
-              <a:lnSpc>
-                <a:spcPct val="100000"/>
-              </a:lnSpc>
-              <a:spcBef>
-                <a:spcPts val="0"/>
-              </a:spcBef>
-              <a:spcAft>
-                <a:spcPts val="0"/>
-              </a:spcAft>
-              <a:buClrTx/>
-              <a:buSzTx/>
-              <a:buFontTx/>
-              <a:buNone/>
-              <a:tabLst/>
-              <a:defRPr/>
-            </a:pPr>
-            <a:r>
-              <a:rPr lang="en-US" dirty="0"/>
-              <a:t>Finding the best way to merge data</a:t>
-            </a:r>
-          </a:p>
-          <a:p>
-            <a:endParaRPr lang="en-US" dirty="0"/>
-          </a:p>
-          <a:p>
-            <a:r>
-              <a:rPr lang="en-US" dirty="0"/>
-              <a:t>All Nan were dropped</a:t>
-            </a:r>
+            <a:r>
+              <a:rPr lang="en-AU" dirty="0"/>
+              <a:t>Annabel</a:t>
+            </a:r>
+          </a:p>
+          <a:p>
+            <a:endParaRPr lang="en-AU" dirty="0"/>
+          </a:p>
+          <a:p>
+            <a:r>
+              <a:rPr lang="en-AU" dirty="0"/>
+              <a:t>Adelaide (#1 for the whole time)</a:t>
+            </a:r>
+          </a:p>
+          <a:p>
+            <a:r>
+              <a:rPr lang="en-AU" dirty="0"/>
+              <a:t>Port Augusta (decrease over period)</a:t>
+            </a:r>
+          </a:p>
+          <a:p>
+            <a:r>
+              <a:rPr lang="en-AU" dirty="0"/>
+              <a:t>Morphett Vale (consistent)</a:t>
+            </a:r>
+          </a:p>
+          <a:p>
+            <a:r>
+              <a:rPr lang="en-AU" dirty="0"/>
+              <a:t>Mount Gambier (consistent)</a:t>
+            </a:r>
+          </a:p>
+          <a:p>
+            <a:r>
+              <a:rPr lang="en-AU" dirty="0"/>
+              <a:t>Port Lincoln (increased in last 2 years)</a:t>
+            </a:r>
+          </a:p>
+          <a:p>
+            <a:r>
+              <a:rPr lang="en-AU" dirty="0" err="1"/>
+              <a:t>Salsibury</a:t>
+            </a:r>
+            <a:r>
+              <a:rPr lang="en-AU" dirty="0"/>
+              <a:t> (consistent)</a:t>
+            </a:r>
+          </a:p>
+          <a:p>
+            <a:r>
+              <a:rPr lang="en-AU" dirty="0"/>
+              <a:t>Murray Bridge (decreased after three years at #3)</a:t>
+            </a:r>
+          </a:p>
+          <a:p>
+            <a:r>
+              <a:rPr lang="en-AU" dirty="0" err="1"/>
+              <a:t>Davoren</a:t>
+            </a:r>
+            <a:r>
+              <a:rPr lang="en-AU" dirty="0"/>
+              <a:t> Park (only in first three years)</a:t>
+            </a:r>
+          </a:p>
+          <a:p>
+            <a:r>
+              <a:rPr lang="en-AU" dirty="0"/>
+              <a:t>Mawson Lakes (consistent)</a:t>
+            </a:r>
+          </a:p>
+          <a:p>
+            <a:r>
+              <a:rPr lang="en-AU" dirty="0"/>
+              <a:t>Parafield Gardens (consistently low)</a:t>
+            </a:r>
+          </a:p>
+          <a:p>
+            <a:r>
+              <a:rPr lang="en-AU" dirty="0"/>
+              <a:t>Whyalla Norrie (only appears twice)</a:t>
+            </a:r>
+          </a:p>
+          <a:p>
+            <a:r>
+              <a:rPr lang="en-AU" dirty="0"/>
+              <a:t>Prospect (only appears once)</a:t>
+            </a:r>
+          </a:p>
+          <a:p>
+            <a:endParaRPr lang="en-AU" dirty="0"/>
           </a:p>
         </p:txBody>
       </p:sp>
@@ -2545,7 +2429,7 @@
     </p:spTree>
     <p:extLst>
       <p:ext uri="{BB962C8B-B14F-4D97-AF65-F5344CB8AC3E}">
-        <p14:creationId xmlns:p14="http://schemas.microsoft.com/office/powerpoint/2010/main" val="3796125349"/>
+        <p14:creationId xmlns:p14="http://schemas.microsoft.com/office/powerpoint/2010/main" val="3627595690"/>
       </p:ext>
     </p:extLst>
   </p:cSld>
@@ -2600,95 +2484,9 @@
           <a:lstStyle/>
           <a:p>
             <a:r>
-              <a:rPr lang="en-AU" dirty="0"/>
+              <a:rPr lang="en-US" dirty="0"/>
               <a:t>Annabel</a:t>
             </a:r>
-          </a:p>
-          <a:p>
-            <a:endParaRPr lang="en-AU" dirty="0"/>
-          </a:p>
-          <a:p>
-            <a:r>
-              <a:rPr lang="en-AU" dirty="0"/>
-              <a:t>Adelaide (#1 for the whole time)</a:t>
-            </a:r>
-          </a:p>
-          <a:p>
-            <a:r>
-              <a:rPr lang="en-AU" dirty="0"/>
-              <a:t>Port Augusta (decrease over period)</a:t>
-            </a:r>
-          </a:p>
-          <a:p>
-            <a:r>
-              <a:rPr lang="en-AU" dirty="0"/>
-              <a:t>Morphett Vale (consistent)</a:t>
-            </a:r>
-          </a:p>
-          <a:p>
-            <a:r>
-              <a:rPr lang="en-AU" dirty="0"/>
-              <a:t>Mount Gambier (consistent)</a:t>
-            </a:r>
-          </a:p>
-          <a:p>
-            <a:r>
-              <a:rPr lang="en-AU" dirty="0"/>
-              <a:t>Port Lincoln (increased in last 2 years)</a:t>
-            </a:r>
-          </a:p>
-          <a:p>
-            <a:r>
-              <a:rPr lang="en-AU" dirty="0" err="1"/>
-              <a:t>Salsibury</a:t>
-            </a:r>
-            <a:r>
-              <a:rPr lang="en-AU" dirty="0"/>
-              <a:t> (consistent)</a:t>
-            </a:r>
-          </a:p>
-          <a:p>
-            <a:r>
-              <a:rPr lang="en-AU" dirty="0"/>
-              <a:t>Murray Bridge (decreased after three years at #3)</a:t>
-            </a:r>
-          </a:p>
-          <a:p>
-            <a:r>
-              <a:rPr lang="en-AU" dirty="0" err="1"/>
-              <a:t>Davoren</a:t>
-            </a:r>
-            <a:r>
-              <a:rPr lang="en-AU" dirty="0"/>
-              <a:t> Park (only in first three years)</a:t>
-            </a:r>
-          </a:p>
-          <a:p>
-            <a:r>
-              <a:rPr lang="en-AU" dirty="0"/>
-              <a:t>Mawson Lakes (consistent)</a:t>
-            </a:r>
-          </a:p>
-          <a:p>
-            <a:r>
-              <a:rPr lang="en-AU" dirty="0"/>
-              <a:t>Parafield Gardens (consistently low)</a:t>
-            </a:r>
-          </a:p>
-          <a:p>
-            <a:r>
-              <a:rPr lang="en-AU" dirty="0"/>
-              <a:t>Whyalla Norrie (only appears twice)</a:t>
-            </a:r>
-          </a:p>
-          <a:p>
-            <a:r>
-              <a:rPr lang="en-AU" dirty="0"/>
-              <a:t>Prospect (only appears once)</a:t>
-            </a:r>
-          </a:p>
-          <a:p>
-            <a:endParaRPr lang="en-AU" dirty="0"/>
           </a:p>
         </p:txBody>
       </p:sp>
@@ -2718,7 +2516,7 @@
     </p:spTree>
     <p:extLst>
       <p:ext uri="{BB962C8B-B14F-4D97-AF65-F5344CB8AC3E}">
-        <p14:creationId xmlns:p14="http://schemas.microsoft.com/office/powerpoint/2010/main" val="3627595690"/>
+        <p14:creationId xmlns:p14="http://schemas.microsoft.com/office/powerpoint/2010/main" val="577759006"/>
       </p:ext>
     </p:extLst>
   </p:cSld>
@@ -2777,6 +2575,144 @@
               <a:t>Annabel</a:t>
             </a:r>
           </a:p>
+          <a:p>
+            <a:endParaRPr lang="en-US" dirty="0"/>
+          </a:p>
+          <a:p>
+            <a:r>
+              <a:rPr lang="en-US" dirty="0"/>
+              <a:t>In this bar chart, 8 of these suburbs remain in the Top 10 Crime Count suburbs over the past 5 years. (</a:t>
+            </a:r>
+            <a:r>
+              <a:rPr lang="en-US" dirty="0" err="1"/>
+              <a:t>ie</a:t>
+            </a:r>
+            <a:r>
+              <a:rPr lang="en-US" dirty="0"/>
+              <a:t>. The Top 8 in 2019-2020 existed in the top 10 for the past 5 financial years)</a:t>
+            </a:r>
+          </a:p>
+          <a:p>
+            <a:pPr marL="228600" indent="-228600">
+              <a:buAutoNum type="arabicParenR"/>
+            </a:pPr>
+            <a:r>
+              <a:rPr lang="en-US" dirty="0"/>
+              <a:t>Adelaide</a:t>
+            </a:r>
+          </a:p>
+          <a:p>
+            <a:pPr marL="228600" indent="-228600">
+              <a:buAutoNum type="arabicParenR"/>
+            </a:pPr>
+            <a:r>
+              <a:rPr lang="en-US" dirty="0" err="1"/>
+              <a:t>Morphette</a:t>
+            </a:r>
+            <a:r>
+              <a:rPr lang="en-US" dirty="0"/>
+              <a:t> Vale</a:t>
+            </a:r>
+          </a:p>
+          <a:p>
+            <a:pPr marL="228600" indent="-228600">
+              <a:buAutoNum type="arabicParenR"/>
+            </a:pPr>
+            <a:r>
+              <a:rPr lang="en-US" dirty="0"/>
+              <a:t>Port Lincoln</a:t>
+            </a:r>
+          </a:p>
+          <a:p>
+            <a:pPr marL="228600" indent="-228600">
+              <a:buAutoNum type="arabicParenR"/>
+            </a:pPr>
+            <a:r>
+              <a:rPr lang="en-US" dirty="0"/>
+              <a:t>Mount Gambier</a:t>
+            </a:r>
+          </a:p>
+          <a:p>
+            <a:pPr marL="228600" indent="-228600">
+              <a:buAutoNum type="arabicParenR"/>
+            </a:pPr>
+            <a:r>
+              <a:rPr lang="en-US" dirty="0"/>
+              <a:t>Murray Bridge</a:t>
+            </a:r>
+          </a:p>
+          <a:p>
+            <a:pPr marL="228600" indent="-228600">
+              <a:buAutoNum type="arabicParenR"/>
+            </a:pPr>
+            <a:r>
+              <a:rPr lang="en-US" dirty="0"/>
+              <a:t>Salisbury</a:t>
+            </a:r>
+          </a:p>
+          <a:p>
+            <a:pPr marL="228600" indent="-228600">
+              <a:buAutoNum type="arabicParenR"/>
+            </a:pPr>
+            <a:r>
+              <a:rPr lang="en-US" dirty="0"/>
+              <a:t>Mawson Lakes</a:t>
+            </a:r>
+          </a:p>
+          <a:p>
+            <a:pPr marL="228600" indent="-228600">
+              <a:buAutoNum type="arabicParenR"/>
+            </a:pPr>
+            <a:r>
+              <a:rPr lang="en-US" dirty="0"/>
+              <a:t>Port Augusta	</a:t>
+            </a:r>
+          </a:p>
+          <a:p>
+            <a:pPr marL="228600" indent="-228600">
+              <a:buAutoNum type="arabicParenR"/>
+            </a:pPr>
+            <a:endParaRPr lang="en-US" dirty="0"/>
+          </a:p>
+          <a:p>
+            <a:pPr marL="0" indent="0">
+              <a:buNone/>
+            </a:pPr>
+            <a:r>
+              <a:rPr lang="en-US" dirty="0"/>
+              <a:t>Of the top 3 crime count suburbs, based on our hypothesis, high crime rates correlates to low property prices, the highest committing crime suburbs should be the cheapest. (</a:t>
+            </a:r>
+            <a:r>
+              <a:rPr lang="en-US" dirty="0" err="1"/>
+              <a:t>ie</a:t>
+            </a:r>
+            <a:r>
+              <a:rPr lang="en-US" dirty="0"/>
+              <a:t>. Lowest ranking) (</a:t>
+            </a:r>
+            <a:r>
+              <a:rPr lang="en-US" dirty="0" err="1"/>
+              <a:t>eg.</a:t>
+            </a:r>
+            <a:r>
+              <a:rPr lang="en-US" dirty="0"/>
+              <a:t> 325</a:t>
+            </a:r>
+            <a:r>
+              <a:rPr lang="en-US" baseline="30000" dirty="0"/>
+              <a:t>th</a:t>
+            </a:r>
+            <a:r>
+              <a:rPr lang="en-US" dirty="0"/>
+              <a:t> ranking for Adelaide is what is expected from the hypothesis) </a:t>
+            </a:r>
+          </a:p>
+          <a:p>
+            <a:pPr marL="0" indent="0">
+              <a:buNone/>
+            </a:pPr>
+            <a:endParaRPr lang="en-US" dirty="0"/>
+          </a:p>
         </p:txBody>
       </p:sp>
       <p:sp>
@@ -2805,7 +2741,7 @@
     </p:spTree>
     <p:extLst>
       <p:ext uri="{BB962C8B-B14F-4D97-AF65-F5344CB8AC3E}">
-        <p14:creationId xmlns:p14="http://schemas.microsoft.com/office/powerpoint/2010/main" val="577759006"/>
+        <p14:creationId xmlns:p14="http://schemas.microsoft.com/office/powerpoint/2010/main" val="4010469913"/>
       </p:ext>
     </p:extLst>
   </p:cSld>
@@ -2860,147 +2796,43 @@
           <a:lstStyle/>
           <a:p>
             <a:r>
-              <a:rPr lang="en-US" dirty="0"/>
-              <a:t>Annabel</a:t>
-            </a:r>
-          </a:p>
-          <a:p>
-            <a:endParaRPr lang="en-US" dirty="0"/>
-          </a:p>
-          <a:p>
-            <a:r>
-              <a:rPr lang="en-US" dirty="0"/>
-              <a:t>In this bar chart, 8 of these suburbs remain in the Top 10 Crime Count suburbs over the past 5 years. (</a:t>
-            </a:r>
-            <a:r>
-              <a:rPr lang="en-US" dirty="0" err="1"/>
-              <a:t>ie</a:t>
-            </a:r>
-            <a:r>
-              <a:rPr lang="en-US" dirty="0"/>
-              <a:t>. The Top 8 in 2019-2020 existed in the top 10 for the past 5 financial years)</a:t>
-            </a:r>
-          </a:p>
-          <a:p>
-            <a:pPr marL="228600" indent="-228600">
-              <a:buAutoNum type="arabicParenR"/>
-            </a:pPr>
-            <a:r>
-              <a:rPr lang="en-US" dirty="0"/>
-              <a:t>Adelaide</a:t>
-            </a:r>
-          </a:p>
-          <a:p>
-            <a:pPr marL="228600" indent="-228600">
-              <a:buAutoNum type="arabicParenR"/>
-            </a:pPr>
-            <a:r>
-              <a:rPr lang="en-US" dirty="0" err="1"/>
-              <a:t>Morphette</a:t>
-            </a:r>
-            <a:r>
-              <a:rPr lang="en-US" dirty="0"/>
-              <a:t> Vale</a:t>
-            </a:r>
-          </a:p>
-          <a:p>
-            <a:pPr marL="228600" indent="-228600">
-              <a:buAutoNum type="arabicParenR"/>
-            </a:pPr>
-            <a:r>
-              <a:rPr lang="en-US" dirty="0"/>
-              <a:t>Port Lincoln</a:t>
-            </a:r>
-          </a:p>
-          <a:p>
-            <a:pPr marL="228600" indent="-228600">
-              <a:buAutoNum type="arabicParenR"/>
-            </a:pPr>
-            <a:r>
-              <a:rPr lang="en-US" dirty="0"/>
-              <a:t>Mount Gambier</a:t>
-            </a:r>
-          </a:p>
-          <a:p>
-            <a:pPr marL="228600" indent="-228600">
-              <a:buAutoNum type="arabicParenR"/>
-            </a:pPr>
-            <a:r>
-              <a:rPr lang="en-US" dirty="0"/>
-              <a:t>Murray Bridge</a:t>
-            </a:r>
-          </a:p>
-          <a:p>
-            <a:pPr marL="228600" indent="-228600">
-              <a:buAutoNum type="arabicParenR"/>
-            </a:pPr>
-            <a:r>
-              <a:rPr lang="en-US" dirty="0"/>
-              <a:t>Salisbury</a:t>
-            </a:r>
-          </a:p>
-          <a:p>
-            <a:pPr marL="228600" indent="-228600">
-              <a:buAutoNum type="arabicParenR"/>
-            </a:pPr>
-            <a:r>
-              <a:rPr lang="en-US" dirty="0"/>
-              <a:t>Mawson Lakes</a:t>
-            </a:r>
-          </a:p>
-          <a:p>
-            <a:pPr marL="228600" indent="-228600">
-              <a:buAutoNum type="arabicParenR"/>
-            </a:pPr>
-            <a:r>
-              <a:rPr lang="en-US" dirty="0"/>
-              <a:t>Port Augusta	</a:t>
-            </a:r>
-          </a:p>
-          <a:p>
-            <a:pPr marL="228600" indent="-228600">
-              <a:buAutoNum type="arabicParenR"/>
-            </a:pPr>
-            <a:endParaRPr lang="en-US" dirty="0"/>
-          </a:p>
-          <a:p>
-            <a:pPr marL="0" indent="0">
-              <a:buNone/>
-            </a:pPr>
-            <a:r>
-              <a:rPr lang="en-US" dirty="0"/>
-              <a:t>Of the top 3 crime count suburbs, based on our hypothesis, high crime rates correlates to low property prices, the highest committing crime suburbs should be the cheapest. (</a:t>
-            </a:r>
-            <a:r>
-              <a:rPr lang="en-US" dirty="0" err="1"/>
-              <a:t>ie</a:t>
-            </a:r>
-            <a:r>
-              <a:rPr lang="en-US" dirty="0"/>
-              <a:t>. Lowest ranking) (</a:t>
-            </a:r>
-            <a:r>
-              <a:rPr lang="en-US" dirty="0" err="1"/>
-              <a:t>eg.</a:t>
-            </a:r>
-            <a:r>
-              <a:rPr lang="en-US" dirty="0"/>
-              <a:t> 325</a:t>
-            </a:r>
-            <a:r>
-              <a:rPr lang="en-US" baseline="30000" dirty="0"/>
-              <a:t>th</a:t>
-            </a:r>
-            <a:r>
-              <a:rPr lang="en-US" dirty="0"/>
-              <a:t> ranking for Adelaide is what is expected from the hypothesis) </a:t>
-            </a:r>
-          </a:p>
-          <a:p>
-            <a:pPr marL="0" indent="0">
-              <a:buNone/>
-            </a:pPr>
-            <a:endParaRPr lang="en-US" dirty="0"/>
+              <a:rPr lang="en-AU" dirty="0">
+                <a:solidFill>
+                  <a:srgbClr val="FF0000"/>
+                </a:solidFill>
+              </a:rPr>
+              <a:t>Miki</a:t>
+            </a:r>
+          </a:p>
+          <a:p>
+            <a:endParaRPr lang="en-AU" dirty="0">
+              <a:solidFill>
+                <a:srgbClr val="FF0000"/>
+              </a:solidFill>
+            </a:endParaRPr>
+          </a:p>
+          <a:p>
+            <a:r>
+              <a:rPr lang="en-AU" dirty="0">
+                <a:solidFill>
+                  <a:srgbClr val="FF0000"/>
+                </a:solidFill>
+              </a:rPr>
+              <a:t>Insert graphs</a:t>
+            </a:r>
+          </a:p>
+          <a:p>
+            <a:r>
+              <a:rPr lang="en-AU" dirty="0">
+                <a:solidFill>
+                  <a:srgbClr val="FF0000"/>
+                </a:solidFill>
+              </a:rPr>
+              <a:t>Insert insights – list suburbs that are in the top 10 over the past five financial years</a:t>
+            </a:r>
+          </a:p>
+          <a:p>
+            <a:endParaRPr lang="en-AU" dirty="0"/>
           </a:p>
         </p:txBody>
       </p:sp>
@@ -3030,7 +2862,7 @@
     </p:spTree>
     <p:extLst>
       <p:ext uri="{BB962C8B-B14F-4D97-AF65-F5344CB8AC3E}">
-        <p14:creationId xmlns:p14="http://schemas.microsoft.com/office/powerpoint/2010/main" val="4010469913"/>
+        <p14:creationId xmlns:p14="http://schemas.microsoft.com/office/powerpoint/2010/main" val="4101713849"/>
       </p:ext>
     </p:extLst>
   </p:cSld>
@@ -6410,7 +6242,7 @@
                   <a:schemeClr val="bg1"/>
                 </a:solidFill>
               </a:rPr>
-              <a:t>2015 -2020</a:t>
+              <a:t>2015 - 2020</a:t>
             </a:r>
           </a:p>
         </p:txBody>
@@ -6625,203 +6457,6 @@
           <p:cNvPr id="2" name="Title 1">
             <a:extLst>
               <a:ext uri="{FF2B5EF4-FFF2-40B4-BE49-F238E27FC236}">
-                <a16:creationId xmlns:a16="http://schemas.microsoft.com/office/drawing/2014/main" id="{D4112190-B47C-470F-9F25-6023D45B677C}"/>
-              </a:ext>
-            </a:extLst>
-          </p:cNvPr>
-          <p:cNvSpPr>
-            <a:spLocks noGrp="1"/>
-          </p:cNvSpPr>
-          <p:nvPr>
-            <p:ph type="title"/>
-          </p:nvPr>
-        </p:nvSpPr>
-        <p:spPr/>
-        <p:txBody>
-          <a:bodyPr>
-            <a:normAutofit fontScale="90000"/>
-          </a:bodyPr>
-          <a:lstStyle/>
-          <a:p>
-            <a:r>
-              <a:rPr lang="en-US" dirty="0"/>
-              <a:t>Data </a:t>
-            </a:r>
-            <a:r>
-              <a:rPr lang="en-US" dirty="0" err="1"/>
-              <a:t>AnalysiS</a:t>
-            </a:r>
-            <a:br>
-              <a:rPr lang="en-US" dirty="0"/>
-            </a:br>
-            <a:r>
-              <a:rPr lang="en-US" dirty="0"/>
-              <a:t> Bottom 10 SUBURBS BY PROPERTY PRICE</a:t>
-            </a:r>
-            <a:br>
-              <a:rPr lang="en-US" dirty="0"/>
-            </a:br>
-            <a:endParaRPr lang="en-AU" dirty="0"/>
-          </a:p>
-        </p:txBody>
-      </p:sp>
-      <p:pic>
-        <p:nvPicPr>
-          <p:cNvPr id="7" name="Content Placeholder 6" descr="Icon&#10;&#10;Description automatically generated">
-            <a:extLst>
-              <a:ext uri="{FF2B5EF4-FFF2-40B4-BE49-F238E27FC236}">
-                <a16:creationId xmlns:a16="http://schemas.microsoft.com/office/drawing/2014/main" id="{8923D90D-FAAA-4BA0-9A62-313D6D654289}"/>
-              </a:ext>
-            </a:extLst>
-          </p:cNvPr>
-          <p:cNvPicPr>
-            <a:picLocks noGrp="1" noChangeAspect="1"/>
-          </p:cNvPicPr>
-          <p:nvPr>
-            <p:ph idx="1"/>
-          </p:nvPr>
-        </p:nvPicPr>
-        <p:blipFill>
-          <a:blip r:embed="rId3">
-            <a:extLst>
-              <a:ext uri="{28A0092B-C50C-407E-A947-70E740481C1C}">
-                <a14:useLocalDpi xmlns:a14="http://schemas.microsoft.com/office/drawing/2010/main" val="0"/>
-              </a:ext>
-            </a:extLst>
-          </a:blip>
-          <a:stretch>
-            <a:fillRect/>
-          </a:stretch>
-        </p:blipFill>
-        <p:spPr>
-          <a:xfrm>
-            <a:off x="614892" y="2739435"/>
-            <a:ext cx="4949501" cy="3289225"/>
-          </a:xfrm>
-        </p:spPr>
-      </p:pic>
-      <p:sp>
-        <p:nvSpPr>
-          <p:cNvPr id="8" name="TextBox 7">
-            <a:extLst>
-              <a:ext uri="{FF2B5EF4-FFF2-40B4-BE49-F238E27FC236}">
-                <a16:creationId xmlns:a16="http://schemas.microsoft.com/office/drawing/2014/main" id="{14598C71-DC44-43A3-9A9E-C566B76F72B2}"/>
-              </a:ext>
-            </a:extLst>
-          </p:cNvPr>
-          <p:cNvSpPr txBox="1"/>
-          <p:nvPr/>
-        </p:nvSpPr>
-        <p:spPr>
-          <a:xfrm>
-            <a:off x="6096000" y="2739435"/>
-            <a:ext cx="2665228" cy="2585323"/>
-          </a:xfrm>
-          <a:prstGeom prst="rect">
-            <a:avLst/>
-          </a:prstGeom>
-          <a:noFill/>
-        </p:spPr>
-        <p:txBody>
-          <a:bodyPr wrap="square" rtlCol="0">
-            <a:spAutoFit/>
-          </a:bodyPr>
-          <a:lstStyle/>
-          <a:p>
-            <a:r>
-              <a:rPr lang="en-AU" dirty="0"/>
-              <a:t>Smithfield Plains</a:t>
-            </a:r>
-          </a:p>
-          <a:p>
-            <a:r>
-              <a:rPr lang="en-AU" dirty="0" err="1"/>
-              <a:t>Davoren</a:t>
-            </a:r>
-            <a:r>
-              <a:rPr lang="en-AU" dirty="0"/>
-              <a:t> Park</a:t>
-            </a:r>
-          </a:p>
-          <a:p>
-            <a:r>
-              <a:rPr lang="en-AU" dirty="0"/>
-              <a:t>Elizabeth Downs</a:t>
-            </a:r>
-          </a:p>
-          <a:p>
-            <a:r>
-              <a:rPr lang="en-AU" dirty="0"/>
-              <a:t>Elizabeth North</a:t>
-            </a:r>
-          </a:p>
-          <a:p>
-            <a:r>
-              <a:rPr lang="en-AU" dirty="0"/>
-              <a:t>Elizabeth Park</a:t>
-            </a:r>
-          </a:p>
-          <a:p>
-            <a:r>
-              <a:rPr lang="en-AU" dirty="0"/>
-              <a:t>Elizabeth East</a:t>
-            </a:r>
-          </a:p>
-          <a:p>
-            <a:r>
-              <a:rPr lang="en-AU" dirty="0"/>
-              <a:t>Elizabeth South</a:t>
-            </a:r>
-          </a:p>
-          <a:p>
-            <a:r>
-              <a:rPr lang="en-AU" dirty="0"/>
-              <a:t>Elizabeth</a:t>
-            </a:r>
-          </a:p>
-          <a:p>
-            <a:r>
-              <a:rPr lang="en-AU" dirty="0"/>
-              <a:t>Elizabeth Vale</a:t>
-            </a:r>
-          </a:p>
-        </p:txBody>
-      </p:sp>
-    </p:spTree>
-    <p:extLst>
-      <p:ext uri="{BB962C8B-B14F-4D97-AF65-F5344CB8AC3E}">
-        <p14:creationId xmlns:p14="http://schemas.microsoft.com/office/powerpoint/2010/main" val="788958099"/>
-      </p:ext>
-    </p:extLst>
-  </p:cSld>
-  <p:clrMapOvr>
-    <a:masterClrMapping/>
-  </p:clrMapOvr>
-</p:sld>
-</file>
-
-<file path=ppt/slides/slide11.xml><?xml version="1.0" encoding="utf-8"?>
-<p:sld xmlns:a="http://schemas.openxmlformats.org/drawingml/2006/main" xmlns:r="http://schemas.openxmlformats.org/officeDocument/2006/relationships" xmlns:p="http://schemas.openxmlformats.org/presentationml/2006/main">
-  <p:cSld>
-    <p:spTree>
-      <p:nvGrpSpPr>
-        <p:cNvPr id="1" name=""/>
-        <p:cNvGrpSpPr/>
-        <p:nvPr/>
-      </p:nvGrpSpPr>
-      <p:grpSpPr>
-        <a:xfrm>
-          <a:off x="0" y="0"/>
-          <a:ext cx="0" cy="0"/>
-          <a:chOff x="0" y="0"/>
-          <a:chExt cx="0" cy="0"/>
-        </a:xfrm>
-      </p:grpSpPr>
-      <p:sp>
-        <p:nvSpPr>
-          <p:cNvPr id="2" name="Title 1">
-            <a:extLst>
-              <a:ext uri="{FF2B5EF4-FFF2-40B4-BE49-F238E27FC236}">
                 <a16:creationId xmlns:a16="http://schemas.microsoft.com/office/drawing/2014/main" id="{41198B77-23C6-4C9A-92CD-4ACB88F9C9FF}"/>
               </a:ext>
             </a:extLst>
@@ -6887,7 +6522,7 @@
         </p:blipFill>
         <p:spPr>
           <a:xfrm>
-            <a:off x="132226" y="2744916"/>
+            <a:off x="630990" y="2744915"/>
             <a:ext cx="5061248" cy="3363488"/>
           </a:xfrm>
           <a:prstGeom prst="rect">
@@ -6923,7 +6558,7 @@
         </p:blipFill>
         <p:spPr>
           <a:xfrm>
-            <a:off x="5437107" y="2803395"/>
+            <a:off x="5963580" y="2840608"/>
             <a:ext cx="4565266" cy="3172103"/>
           </a:xfrm>
           <a:prstGeom prst="rect">
@@ -6944,7 +6579,7 @@
 </p:sld>
 </file>
 
-<file path=ppt/slides/slide12.xml><?xml version="1.0" encoding="utf-8"?>
+<file path=ppt/slides/slide11.xml><?xml version="1.0" encoding="utf-8"?>
 <p:sld xmlns:a="http://schemas.openxmlformats.org/drawingml/2006/main" xmlns:r="http://schemas.openxmlformats.org/officeDocument/2006/relationships" xmlns:p="http://schemas.openxmlformats.org/presentationml/2006/main">
   <p:cSld>
     <p:spTree>
@@ -7032,7 +6667,7 @@
         </p:blipFill>
         <p:spPr>
           <a:xfrm>
-            <a:off x="4849066" y="2791331"/>
+            <a:off x="5791175" y="2811755"/>
             <a:ext cx="4593309" cy="3052515"/>
           </a:xfrm>
         </p:spPr>
@@ -7064,7 +6699,7 @@
         </p:blipFill>
         <p:spPr>
           <a:xfrm>
-            <a:off x="133339" y="2791332"/>
+            <a:off x="756794" y="2811755"/>
             <a:ext cx="4593309" cy="3052515"/>
           </a:xfrm>
           <a:prstGeom prst="rect">
@@ -7085,7 +6720,7 @@
 </p:sld>
 </file>
 
-<file path=ppt/slides/slide13.xml><?xml version="1.0" encoding="utf-8"?>
+<file path=ppt/slides/slide12.xml><?xml version="1.0" encoding="utf-8"?>
 <p:sld xmlns:a="http://schemas.openxmlformats.org/drawingml/2006/main" xmlns:r="http://schemas.openxmlformats.org/officeDocument/2006/relationships" xmlns:p="http://schemas.openxmlformats.org/presentationml/2006/main">
   <p:cSld>
     <p:spTree>
@@ -7120,7 +6755,9 @@
         </p:nvSpPr>
         <p:spPr/>
         <p:txBody>
-          <a:bodyPr/>
+          <a:bodyPr>
+            <a:normAutofit/>
+          </a:bodyPr>
           <a:lstStyle/>
           <a:p>
             <a:r>
@@ -7136,83 +6773,12 @@
             </a:br>
             <a:r>
               <a:rPr lang="en-US" dirty="0"/>
-              <a:t> TOP 10 SUBURBS BY PROPERTY PRICE</a:t>
+              <a:t> 2019-2020 TOP 3 PROPERTY RANKING</a:t>
             </a:r>
             <a:endParaRPr lang="en-AU" dirty="0"/>
           </a:p>
         </p:txBody>
       </p:sp>
-      <p:pic>
-        <p:nvPicPr>
-          <p:cNvPr id="5" name="Content Placeholder 4" descr="Icon&#10;&#10;Description automatically generated">
-            <a:extLst>
-              <a:ext uri="{FF2B5EF4-FFF2-40B4-BE49-F238E27FC236}">
-                <a16:creationId xmlns:a16="http://schemas.microsoft.com/office/drawing/2014/main" id="{53B60C00-7268-4D8D-87AE-177F94376CF4}"/>
-              </a:ext>
-            </a:extLst>
-          </p:cNvPr>
-          <p:cNvPicPr>
-            <a:picLocks noGrp="1" noChangeAspect="1"/>
-          </p:cNvPicPr>
-          <p:nvPr>
-            <p:ph idx="1"/>
-          </p:nvPr>
-        </p:nvPicPr>
-        <p:blipFill>
-          <a:blip r:embed="rId3">
-            <a:extLst>
-              <a:ext uri="{28A0092B-C50C-407E-A947-70E740481C1C}">
-                <a14:useLocalDpi xmlns:a14="http://schemas.microsoft.com/office/drawing/2010/main" val="0"/>
-              </a:ext>
-            </a:extLst>
-          </a:blip>
-          <a:stretch>
-            <a:fillRect/>
-          </a:stretch>
-        </p:blipFill>
-        <p:spPr>
-          <a:xfrm>
-            <a:off x="6523694" y="2791332"/>
-            <a:ext cx="4593309" cy="3101975"/>
-          </a:xfrm>
-        </p:spPr>
-      </p:pic>
-      <p:pic>
-        <p:nvPicPr>
-          <p:cNvPr id="6" name="Content Placeholder 4" descr="Icon&#10;&#10;Description automatically generated">
-            <a:extLst>
-              <a:ext uri="{FF2B5EF4-FFF2-40B4-BE49-F238E27FC236}">
-                <a16:creationId xmlns:a16="http://schemas.microsoft.com/office/drawing/2014/main" id="{1389C4C6-FAF5-47AD-A090-87965B0B2ED8}"/>
-              </a:ext>
-            </a:extLst>
-          </p:cNvPr>
-          <p:cNvPicPr>
-            <a:picLocks noChangeAspect="1"/>
-          </p:cNvPicPr>
-          <p:nvPr/>
-        </p:nvPicPr>
-        <p:blipFill>
-          <a:blip r:embed="rId4">
-            <a:extLst>
-              <a:ext uri="{28A0092B-C50C-407E-A947-70E740481C1C}">
-                <a14:useLocalDpi xmlns:a14="http://schemas.microsoft.com/office/drawing/2010/main" val="0"/>
-              </a:ext>
-            </a:extLst>
-          </a:blip>
-          <a:stretch>
-            <a:fillRect/>
-          </a:stretch>
-        </p:blipFill>
-        <p:spPr>
-          <a:xfrm>
-            <a:off x="1308237" y="2791333"/>
-            <a:ext cx="4593309" cy="3101975"/>
-          </a:xfrm>
-          <a:prstGeom prst="rect">
-            <a:avLst/>
-          </a:prstGeom>
-        </p:spPr>
-      </p:pic>
       <p:graphicFrame>
         <p:nvGraphicFramePr>
           <p:cNvPr id="3" name="Table 2">
@@ -7225,11 +6791,17 @@
           <p:cNvGraphicFramePr>
             <a:graphicFrameLocks noGrp="1"/>
           </p:cNvGraphicFramePr>
-          <p:nvPr/>
+          <p:nvPr>
+            <p:extLst>
+              <p:ext uri="{D42A27DB-BD31-4B8C-83A1-F6EECF244321}">
+                <p14:modId xmlns:p14="http://schemas.microsoft.com/office/powerpoint/2010/main" val="796000701"/>
+              </p:ext>
+            </p:extLst>
+          </p:nvPr>
         </p:nvGraphicFramePr>
         <p:xfrm>
-          <a:off x="7141751" y="5086857"/>
-          <a:ext cx="4597400" cy="1612900"/>
+          <a:off x="2529744" y="2772985"/>
+          <a:ext cx="7113019" cy="2503460"/>
         </p:xfrm>
         <a:graphic>
           <a:graphicData uri="http://schemas.openxmlformats.org/drawingml/2006/table">
@@ -7238,21 +6810,21 @@
                 <a:tableStyleId>{00A15C55-8517-42AA-B614-E9B94910E393}</a:tableStyleId>
               </a:tblPr>
               <a:tblGrid>
-                <a:gridCol w="1295400">
+                <a:gridCol w="2004221">
                   <a:extLst>
                     <a:ext uri="{9D8B030D-6E8A-4147-A177-3AD203B41FA5}">
                       <a16:colId xmlns:a16="http://schemas.microsoft.com/office/drawing/2014/main" val="2286635193"/>
                     </a:ext>
                   </a:extLst>
                 </a:gridCol>
-                <a:gridCol w="1651000">
+                <a:gridCol w="2554399">
                   <a:extLst>
                     <a:ext uri="{9D8B030D-6E8A-4147-A177-3AD203B41FA5}">
                       <a16:colId xmlns:a16="http://schemas.microsoft.com/office/drawing/2014/main" val="4109209908"/>
                     </a:ext>
                   </a:extLst>
                 </a:gridCol>
-                <a:gridCol w="1651000">
+                <a:gridCol w="2554399">
                   <a:extLst>
                     <a:ext uri="{9D8B030D-6E8A-4147-A177-3AD203B41FA5}">
                       <a16:colId xmlns:a16="http://schemas.microsoft.com/office/drawing/2014/main" val="1998260925"/>
@@ -7260,7 +6832,7 @@
                   </a:extLst>
                 </a:gridCol>
               </a:tblGrid>
-              <a:tr h="203200">
+              <a:tr h="408175">
                 <a:tc gridSpan="3">
                   <a:txBody>
                     <a:bodyPr/>
@@ -7347,7 +6919,7 @@
                   </a:ext>
                 </a:extLst>
               </a:tr>
-              <a:tr h="596900">
+              <a:tr h="462585">
                 <a:tc>
                   <a:txBody>
                     <a:bodyPr/>
@@ -7481,18 +7053,27 @@
                     <a:p>
                       <a:pPr algn="ctr" fontAlgn="t"/>
                       <a:r>
-                        <a:rPr lang="en-AU" sz="1200" u="none" strike="noStrike">
+                        <a:rPr lang="en-AU" sz="1200" u="none" strike="noStrike" dirty="0">
                           <a:effectLst/>
                         </a:rPr>
-                        <a:t>Crime Ranking           </a:t>
+                        <a:t>Crime Ranking        </a:t>
+                      </a:r>
+                    </a:p>
+                    <a:p>
+                      <a:pPr algn="ctr" fontAlgn="t"/>
+                      <a:r>
+                        <a:rPr lang="en-AU" sz="1200" u="none" strike="noStrike" dirty="0">
+                          <a:effectLst/>
+                        </a:rPr>
+                        <a:t>   </a:t>
                       </a:r>
                       <a:r>
-                        <a:rPr lang="en-AU" sz="1000" u="none" strike="noStrike">
+                        <a:rPr lang="en-AU" sz="1000" u="none" strike="noStrike" dirty="0">
                           <a:effectLst/>
                         </a:rPr>
                         <a:t>(Ranking 1: highest crime count)</a:t>
                       </a:r>
-                      <a:endParaRPr lang="en-AU" sz="1200" b="1" i="0" u="none" strike="noStrike">
+                      <a:endParaRPr lang="en-AU" sz="1200" b="1" i="0" u="none" strike="noStrike" dirty="0">
                         <a:solidFill>
                           <a:srgbClr val="000000"/>
                         </a:solidFill>
@@ -7546,7 +7127,7 @@
                   </a:ext>
                 </a:extLst>
               </a:tr>
-              <a:tr h="203200">
+              <a:tr h="408175">
                 <a:tc>
                   <a:txBody>
                     <a:bodyPr/>
@@ -7733,7 +7314,7 @@
                   </a:ext>
                 </a:extLst>
               </a:tr>
-              <a:tr h="203200">
+              <a:tr h="408175">
                 <a:tc>
                   <a:txBody>
                     <a:bodyPr/>
@@ -7861,12 +7442,12 @@
                     <a:p>
                       <a:pPr algn="ctr" fontAlgn="ctr"/>
                       <a:r>
-                        <a:rPr lang="en-AU" sz="1200" u="none" strike="noStrike">
+                        <a:rPr lang="en-AU" sz="1200" u="none" strike="noStrike" dirty="0">
                           <a:effectLst/>
                         </a:rPr>
                         <a:t>267</a:t>
                       </a:r>
-                      <a:endParaRPr lang="en-AU" sz="1200" b="0" i="0" u="none" strike="noStrike">
+                      <a:endParaRPr lang="en-AU" sz="1200" b="0" i="0" u="none" strike="noStrike" dirty="0">
                         <a:solidFill>
                           <a:srgbClr val="000000"/>
                         </a:solidFill>
@@ -7920,7 +7501,7 @@
                   </a:ext>
                 </a:extLst>
               </a:tr>
-              <a:tr h="203200">
+              <a:tr h="408175">
                 <a:tc>
                   <a:txBody>
                     <a:bodyPr/>
@@ -8107,7 +7688,7 @@
                   </a:ext>
                 </a:extLst>
               </a:tr>
-              <a:tr h="203200">
+              <a:tr h="408175">
                 <a:tc gridSpan="3">
                   <a:txBody>
                     <a:bodyPr/>
@@ -8211,7 +7792,7 @@
 </p:sld>
 </file>
 
-<file path=ppt/slides/slide14.xml><?xml version="1.0" encoding="utf-8"?>
+<file path=ppt/slides/slide13.xml><?xml version="1.0" encoding="utf-8"?>
 <p:sld xmlns:a="http://schemas.openxmlformats.org/drawingml/2006/main" xmlns:r="http://schemas.openxmlformats.org/officeDocument/2006/relationships" xmlns:p="http://schemas.openxmlformats.org/presentationml/2006/main">
   <p:cSld>
     <p:spTree>
@@ -8320,7 +7901,7 @@
                   <a:schemeClr val="tx1"/>
                 </a:solidFill>
               </a:rPr>
-              <a:t>Coefficient: -305.48</a:t>
+              <a:t>Coefficient (Slope): -305.48</a:t>
             </a:r>
           </a:p>
           <a:p>
@@ -8393,15 +7974,8 @@
                   <a:schemeClr val="tx1"/>
                 </a:solidFill>
               </a:rPr>
-              <a:t>Reject alternative hypothesis</a:t>
-            </a:r>
-          </a:p>
-          <a:p>
-            <a:endParaRPr lang="en-AU" dirty="0">
-              <a:solidFill>
-                <a:schemeClr val="tx1"/>
-              </a:solidFill>
-            </a:endParaRPr>
+              <a:t>Reject hypothesis</a:t>
+            </a:r>
           </a:p>
         </p:txBody>
       </p:sp>
@@ -8454,6 +8028,192 @@
 </p:sld>
 </file>
 
+<file path=ppt/slides/slide14.xml><?xml version="1.0" encoding="utf-8"?>
+<p:sld xmlns:a="http://schemas.openxmlformats.org/drawingml/2006/main" xmlns:r="http://schemas.openxmlformats.org/officeDocument/2006/relationships" xmlns:p="http://schemas.openxmlformats.org/presentationml/2006/main">
+  <p:cSld>
+    <p:spTree>
+      <p:nvGrpSpPr>
+        <p:cNvPr id="1" name=""/>
+        <p:cNvGrpSpPr/>
+        <p:nvPr/>
+      </p:nvGrpSpPr>
+      <p:grpSpPr>
+        <a:xfrm>
+          <a:off x="0" y="0"/>
+          <a:ext cx="0" cy="0"/>
+          <a:chOff x="0" y="0"/>
+          <a:chExt cx="0" cy="0"/>
+        </a:xfrm>
+      </p:grpSpPr>
+      <p:sp>
+        <p:nvSpPr>
+          <p:cNvPr id="2" name="Title 1">
+            <a:extLst>
+              <a:ext uri="{FF2B5EF4-FFF2-40B4-BE49-F238E27FC236}">
+                <a16:creationId xmlns:a16="http://schemas.microsoft.com/office/drawing/2014/main" id="{97EDCECB-1016-4042-BFE3-761303E9E76C}"/>
+              </a:ext>
+            </a:extLst>
+          </p:cNvPr>
+          <p:cNvSpPr>
+            <a:spLocks noGrp="1"/>
+          </p:cNvSpPr>
+          <p:nvPr>
+            <p:ph type="title"/>
+          </p:nvPr>
+        </p:nvSpPr>
+        <p:spPr/>
+        <p:txBody>
+          <a:bodyPr/>
+          <a:lstStyle/>
+          <a:p>
+            <a:r>
+              <a:rPr lang="en-US" dirty="0"/>
+              <a:t>PROJECT CHALLENGES</a:t>
+            </a:r>
+            <a:br>
+              <a:rPr lang="en-US" dirty="0"/>
+            </a:br>
+            <a:endParaRPr lang="en-AU" dirty="0"/>
+          </a:p>
+        </p:txBody>
+      </p:sp>
+      <p:sp>
+        <p:nvSpPr>
+          <p:cNvPr id="3" name="Content Placeholder 2">
+            <a:extLst>
+              <a:ext uri="{FF2B5EF4-FFF2-40B4-BE49-F238E27FC236}">
+                <a16:creationId xmlns:a16="http://schemas.microsoft.com/office/drawing/2014/main" id="{41041EED-5A1F-4BA1-9880-478BF56219F1}"/>
+              </a:ext>
+            </a:extLst>
+          </p:cNvPr>
+          <p:cNvSpPr>
+            <a:spLocks noGrp="1"/>
+          </p:cNvSpPr>
+          <p:nvPr>
+            <p:ph idx="1"/>
+          </p:nvPr>
+        </p:nvSpPr>
+        <p:spPr>
+          <a:xfrm>
+            <a:off x="2231136" y="2638044"/>
+            <a:ext cx="7729728" cy="3392366"/>
+          </a:xfrm>
+        </p:spPr>
+        <p:txBody>
+          <a:bodyPr>
+            <a:normAutofit fontScale="92500" lnSpcReduction="20000"/>
+          </a:bodyPr>
+          <a:lstStyle/>
+          <a:p>
+            <a:pPr marL="0" indent="0">
+              <a:buNone/>
+            </a:pPr>
+            <a:r>
+              <a:rPr lang="en-US" u="sng" dirty="0"/>
+              <a:t>Challenges</a:t>
+            </a:r>
+          </a:p>
+          <a:p>
+            <a:pPr>
+              <a:buFont typeface="Arial" panose="020B0604020202020204" pitchFamily="34" charset="0"/>
+              <a:buChar char="•"/>
+            </a:pPr>
+            <a:r>
+              <a:rPr lang="en-US" dirty="0"/>
+              <a:t>Initially data for Western Australia was considered however there was no common column to combine the two data frames on </a:t>
+            </a:r>
+          </a:p>
+          <a:p>
+            <a:pPr>
+              <a:buFont typeface="Arial" panose="020B0604020202020204" pitchFamily="34" charset="0"/>
+              <a:buChar char="•"/>
+            </a:pPr>
+            <a:r>
+              <a:rPr lang="en-US" dirty="0"/>
+              <a:t>Raw crime data was sorted by dates and not yearly quarters </a:t>
+            </a:r>
+          </a:p>
+          <a:p>
+            <a:pPr>
+              <a:buFont typeface="Arial" panose="020B0604020202020204" pitchFamily="34" charset="0"/>
+              <a:buChar char="•"/>
+            </a:pPr>
+            <a:r>
+              <a:rPr lang="en-US" dirty="0"/>
+              <a:t>Determining how to find an appropriate property value to represent the financial year as only quarterly median prices were provided in the raw data</a:t>
+            </a:r>
+          </a:p>
+          <a:p>
+            <a:pPr marL="0" indent="0">
+              <a:buNone/>
+            </a:pPr>
+            <a:endParaRPr lang="en-US" u="sng" dirty="0"/>
+          </a:p>
+          <a:p>
+            <a:pPr marL="0" indent="0">
+              <a:buNone/>
+            </a:pPr>
+            <a:r>
+              <a:rPr lang="en-US" u="sng" dirty="0"/>
+              <a:t>Given Additional Project Time</a:t>
+            </a:r>
+          </a:p>
+          <a:p>
+            <a:pPr>
+              <a:buFont typeface="Arial" panose="020B0604020202020204" pitchFamily="34" charset="0"/>
+              <a:buChar char="•"/>
+            </a:pPr>
+            <a:r>
+              <a:rPr lang="en-US" dirty="0"/>
+              <a:t>Dropped all rows with data that was not available (</a:t>
+            </a:r>
+            <a:r>
+              <a:rPr lang="en-US" dirty="0" err="1"/>
+              <a:t>NaN</a:t>
+            </a:r>
+            <a:r>
+              <a:rPr lang="en-US" dirty="0"/>
+              <a:t>)</a:t>
+            </a:r>
+          </a:p>
+          <a:p>
+            <a:pPr>
+              <a:buFont typeface="Arial" panose="020B0604020202020204" pitchFamily="34" charset="0"/>
+              <a:buChar char="•"/>
+            </a:pPr>
+            <a:r>
+              <a:rPr lang="en-US" dirty="0"/>
+              <a:t>Explore other variables affecting property prices</a:t>
+            </a:r>
+          </a:p>
+          <a:p>
+            <a:pPr>
+              <a:buFont typeface="Arial" panose="020B0604020202020204" pitchFamily="34" charset="0"/>
+              <a:buChar char="•"/>
+            </a:pPr>
+            <a:r>
+              <a:rPr lang="en-US" dirty="0"/>
+              <a:t>Further analysis into crime types versus crime count and property prices</a:t>
+            </a:r>
+          </a:p>
+          <a:p>
+            <a:endParaRPr lang="en-AU" dirty="0"/>
+          </a:p>
+        </p:txBody>
+      </p:sp>
+    </p:spTree>
+    <p:extLst>
+      <p:ext uri="{BB962C8B-B14F-4D97-AF65-F5344CB8AC3E}">
+        <p14:creationId xmlns:p14="http://schemas.microsoft.com/office/powerpoint/2010/main" val="3017070493"/>
+      </p:ext>
+    </p:extLst>
+  </p:cSld>
+  <p:clrMapOvr>
+    <a:masterClrMapping/>
+  </p:clrMapOvr>
+</p:sld>
+</file>
+
 <file path=ppt/slides/slide15.xml><?xml version="1.0" encoding="utf-8"?>
 <p:sld xmlns:a="http://schemas.openxmlformats.org/drawingml/2006/main" xmlns:r="http://schemas.openxmlformats.org/officeDocument/2006/relationships" xmlns:p="http://schemas.openxmlformats.org/presentationml/2006/main">
   <p:cSld>
@@ -8476,192 +8236,6 @@
           <p:cNvPr id="2" name="Title 1">
             <a:extLst>
               <a:ext uri="{FF2B5EF4-FFF2-40B4-BE49-F238E27FC236}">
-                <a16:creationId xmlns:a16="http://schemas.microsoft.com/office/drawing/2014/main" id="{97EDCECB-1016-4042-BFE3-761303E9E76C}"/>
-              </a:ext>
-            </a:extLst>
-          </p:cNvPr>
-          <p:cNvSpPr>
-            <a:spLocks noGrp="1"/>
-          </p:cNvSpPr>
-          <p:nvPr>
-            <p:ph type="title"/>
-          </p:nvPr>
-        </p:nvSpPr>
-        <p:spPr/>
-        <p:txBody>
-          <a:bodyPr/>
-          <a:lstStyle/>
-          <a:p>
-            <a:r>
-              <a:rPr lang="en-US" dirty="0"/>
-              <a:t>PROJECT CHALLENGES</a:t>
-            </a:r>
-            <a:br>
-              <a:rPr lang="en-US" dirty="0"/>
-            </a:br>
-            <a:endParaRPr lang="en-AU" dirty="0"/>
-          </a:p>
-        </p:txBody>
-      </p:sp>
-      <p:sp>
-        <p:nvSpPr>
-          <p:cNvPr id="3" name="Content Placeholder 2">
-            <a:extLst>
-              <a:ext uri="{FF2B5EF4-FFF2-40B4-BE49-F238E27FC236}">
-                <a16:creationId xmlns:a16="http://schemas.microsoft.com/office/drawing/2014/main" id="{41041EED-5A1F-4BA1-9880-478BF56219F1}"/>
-              </a:ext>
-            </a:extLst>
-          </p:cNvPr>
-          <p:cNvSpPr>
-            <a:spLocks noGrp="1"/>
-          </p:cNvSpPr>
-          <p:nvPr>
-            <p:ph idx="1"/>
-          </p:nvPr>
-        </p:nvSpPr>
-        <p:spPr>
-          <a:xfrm>
-            <a:off x="2231136" y="2638044"/>
-            <a:ext cx="7729728" cy="3392366"/>
-          </a:xfrm>
-        </p:spPr>
-        <p:txBody>
-          <a:bodyPr>
-            <a:normAutofit fontScale="92500" lnSpcReduction="20000"/>
-          </a:bodyPr>
-          <a:lstStyle/>
-          <a:p>
-            <a:pPr marL="0" indent="0">
-              <a:buNone/>
-            </a:pPr>
-            <a:r>
-              <a:rPr lang="en-US" u="sng" dirty="0"/>
-              <a:t>Challenges</a:t>
-            </a:r>
-          </a:p>
-          <a:p>
-            <a:pPr>
-              <a:buFont typeface="Arial" panose="020B0604020202020204" pitchFamily="34" charset="0"/>
-              <a:buChar char="•"/>
-            </a:pPr>
-            <a:r>
-              <a:rPr lang="en-US" dirty="0"/>
-              <a:t>Initially data for Western Australia was considered however there was no common column to combine the two data frames on </a:t>
-            </a:r>
-          </a:p>
-          <a:p>
-            <a:pPr>
-              <a:buFont typeface="Arial" panose="020B0604020202020204" pitchFamily="34" charset="0"/>
-              <a:buChar char="•"/>
-            </a:pPr>
-            <a:r>
-              <a:rPr lang="en-US" dirty="0"/>
-              <a:t>Raw crime data was sorted by dates and not yearly quarters </a:t>
-            </a:r>
-          </a:p>
-          <a:p>
-            <a:pPr>
-              <a:buFont typeface="Arial" panose="020B0604020202020204" pitchFamily="34" charset="0"/>
-              <a:buChar char="•"/>
-            </a:pPr>
-            <a:r>
-              <a:rPr lang="en-US" dirty="0"/>
-              <a:t>Determining how to find an appropriate property value to represent the financial year as only quarterly median prices were provided in the raw data</a:t>
-            </a:r>
-          </a:p>
-          <a:p>
-            <a:pPr marL="0" indent="0">
-              <a:buNone/>
-            </a:pPr>
-            <a:endParaRPr lang="en-US" u="sng" dirty="0"/>
-          </a:p>
-          <a:p>
-            <a:pPr marL="0" indent="0">
-              <a:buNone/>
-            </a:pPr>
-            <a:r>
-              <a:rPr lang="en-US" u="sng" dirty="0"/>
-              <a:t>Given Additional Project Time</a:t>
-            </a:r>
-          </a:p>
-          <a:p>
-            <a:pPr>
-              <a:buFont typeface="Arial" panose="020B0604020202020204" pitchFamily="34" charset="0"/>
-              <a:buChar char="•"/>
-            </a:pPr>
-            <a:r>
-              <a:rPr lang="en-US" dirty="0"/>
-              <a:t>Dropped all rows with data that was not available (</a:t>
-            </a:r>
-            <a:r>
-              <a:rPr lang="en-US" dirty="0" err="1"/>
-              <a:t>NaN</a:t>
-            </a:r>
-            <a:r>
-              <a:rPr lang="en-US" dirty="0"/>
-              <a:t>)</a:t>
-            </a:r>
-          </a:p>
-          <a:p>
-            <a:pPr>
-              <a:buFont typeface="Arial" panose="020B0604020202020204" pitchFamily="34" charset="0"/>
-              <a:buChar char="•"/>
-            </a:pPr>
-            <a:r>
-              <a:rPr lang="en-US" dirty="0"/>
-              <a:t>Explore other variables affecting property prices</a:t>
-            </a:r>
-          </a:p>
-          <a:p>
-            <a:pPr>
-              <a:buFont typeface="Arial" panose="020B0604020202020204" pitchFamily="34" charset="0"/>
-              <a:buChar char="•"/>
-            </a:pPr>
-            <a:r>
-              <a:rPr lang="en-US" dirty="0"/>
-              <a:t>Further analysis into crime types versus crime count and property prices</a:t>
-            </a:r>
-          </a:p>
-          <a:p>
-            <a:endParaRPr lang="en-AU" dirty="0"/>
-          </a:p>
-        </p:txBody>
-      </p:sp>
-    </p:spTree>
-    <p:extLst>
-      <p:ext uri="{BB962C8B-B14F-4D97-AF65-F5344CB8AC3E}">
-        <p14:creationId xmlns:p14="http://schemas.microsoft.com/office/powerpoint/2010/main" val="3017070493"/>
-      </p:ext>
-    </p:extLst>
-  </p:cSld>
-  <p:clrMapOvr>
-    <a:masterClrMapping/>
-  </p:clrMapOvr>
-</p:sld>
-</file>
-
-<file path=ppt/slides/slide16.xml><?xml version="1.0" encoding="utf-8"?>
-<p:sld xmlns:a="http://schemas.openxmlformats.org/drawingml/2006/main" xmlns:r="http://schemas.openxmlformats.org/officeDocument/2006/relationships" xmlns:p="http://schemas.openxmlformats.org/presentationml/2006/main">
-  <p:cSld>
-    <p:spTree>
-      <p:nvGrpSpPr>
-        <p:cNvPr id="1" name=""/>
-        <p:cNvGrpSpPr/>
-        <p:nvPr/>
-      </p:nvGrpSpPr>
-      <p:grpSpPr>
-        <a:xfrm>
-          <a:off x="0" y="0"/>
-          <a:ext cx="0" cy="0"/>
-          <a:chOff x="0" y="0"/>
-          <a:chExt cx="0" cy="0"/>
-        </a:xfrm>
-      </p:grpSpPr>
-      <p:sp>
-        <p:nvSpPr>
-          <p:cNvPr id="2" name="Title 1">
-            <a:extLst>
-              <a:ext uri="{FF2B5EF4-FFF2-40B4-BE49-F238E27FC236}">
                 <a16:creationId xmlns:a16="http://schemas.microsoft.com/office/drawing/2014/main" id="{0F0E2EE8-FA75-4D9D-8908-3E5819AA8CB1}"/>
               </a:ext>
             </a:extLst>
@@ -8685,34 +8259,6 @@
             <a:br>
               <a:rPr lang="en-US" dirty="0"/>
             </a:br>
-            <a:endParaRPr lang="en-AU" dirty="0"/>
-          </a:p>
-        </p:txBody>
-      </p:sp>
-      <p:sp>
-        <p:nvSpPr>
-          <p:cNvPr id="3" name="Content Placeholder 2">
-            <a:extLst>
-              <a:ext uri="{FF2B5EF4-FFF2-40B4-BE49-F238E27FC236}">
-                <a16:creationId xmlns:a16="http://schemas.microsoft.com/office/drawing/2014/main" id="{498E87A0-0BC5-434B-930D-C2DB78772A44}"/>
-              </a:ext>
-            </a:extLst>
-          </p:cNvPr>
-          <p:cNvSpPr>
-            <a:spLocks noGrp="1"/>
-          </p:cNvSpPr>
-          <p:nvPr>
-            <p:ph idx="1"/>
-          </p:nvPr>
-        </p:nvSpPr>
-        <p:spPr/>
-        <p:txBody>
-          <a:bodyPr/>
-          <a:lstStyle/>
-          <a:p>
-            <a:pPr marL="0" indent="0">
-              <a:buNone/>
-            </a:pPr>
             <a:endParaRPr lang="en-AU" dirty="0"/>
           </a:p>
         </p:txBody>
@@ -8730,7 +8276,7 @@
 </p:sld>
 </file>
 
-<file path=ppt/slides/slide17.xml><?xml version="1.0" encoding="utf-8"?>
+<file path=ppt/slides/slide16.xml><?xml version="1.0" encoding="utf-8"?>
 <p:sld xmlns:a="http://schemas.openxmlformats.org/drawingml/2006/main" xmlns:r="http://schemas.openxmlformats.org/officeDocument/2006/relationships" xmlns:p="http://schemas.openxmlformats.org/presentationml/2006/main" show="0">
   <p:cSld>
     <p:spTree>
@@ -8920,7 +8466,7 @@
 </p:sld>
 </file>
 
-<file path=ppt/slides/slide18.xml><?xml version="1.0" encoding="utf-8"?>
+<file path=ppt/slides/slide17.xml><?xml version="1.0" encoding="utf-8"?>
 <p:sld xmlns:a="http://schemas.openxmlformats.org/drawingml/2006/main" xmlns:r="http://schemas.openxmlformats.org/officeDocument/2006/relationships" xmlns:p="http://schemas.openxmlformats.org/presentationml/2006/main" show="0">
   <p:cSld>
     <p:spTree>
@@ -9243,7 +8789,7 @@
           <a:p>
             <a:r>
               <a:rPr lang="en-US" dirty="0"/>
-              <a:t>Relevant to Australian audience ,in terms of crime and property ownership</a:t>
+              <a:t>Relevant to Australian audience, in terms of crime and property ownership</a:t>
             </a:r>
           </a:p>
           <a:p>
@@ -9860,197 +9406,6 @@
 </file>
 
 <file path=ppt/slides/slide6.xml><?xml version="1.0" encoding="utf-8"?>
-<p:sld xmlns:a="http://schemas.openxmlformats.org/drawingml/2006/main" xmlns:r="http://schemas.openxmlformats.org/officeDocument/2006/relationships" xmlns:p="http://schemas.openxmlformats.org/presentationml/2006/main">
-  <p:cSld>
-    <p:spTree>
-      <p:nvGrpSpPr>
-        <p:cNvPr id="1" name=""/>
-        <p:cNvGrpSpPr/>
-        <p:nvPr/>
-      </p:nvGrpSpPr>
-      <p:grpSpPr>
-        <a:xfrm>
-          <a:off x="0" y="0"/>
-          <a:ext cx="0" cy="0"/>
-          <a:chOff x="0" y="0"/>
-          <a:chExt cx="0" cy="0"/>
-        </a:xfrm>
-      </p:grpSpPr>
-      <p:sp>
-        <p:nvSpPr>
-          <p:cNvPr id="2" name="Title 1">
-            <a:extLst>
-              <a:ext uri="{FF2B5EF4-FFF2-40B4-BE49-F238E27FC236}">
-                <a16:creationId xmlns:a16="http://schemas.microsoft.com/office/drawing/2014/main" id="{A05E3969-0ED9-2A4B-8412-48313BA670F1}"/>
-              </a:ext>
-            </a:extLst>
-          </p:cNvPr>
-          <p:cNvSpPr>
-            <a:spLocks noGrp="1"/>
-          </p:cNvSpPr>
-          <p:nvPr>
-            <p:ph type="title"/>
-          </p:nvPr>
-        </p:nvSpPr>
-        <p:spPr/>
-        <p:txBody>
-          <a:bodyPr/>
-          <a:lstStyle/>
-          <a:p>
-            <a:r>
-              <a:rPr lang="en-US" dirty="0"/>
-              <a:t>DATA SOURCE DEFINITIONS – PROPERTY DATA</a:t>
-            </a:r>
-          </a:p>
-        </p:txBody>
-      </p:sp>
-      <p:sp>
-        <p:nvSpPr>
-          <p:cNvPr id="3" name="Content Placeholder 2">
-            <a:extLst>
-              <a:ext uri="{FF2B5EF4-FFF2-40B4-BE49-F238E27FC236}">
-                <a16:creationId xmlns:a16="http://schemas.microsoft.com/office/drawing/2014/main" id="{6E05505D-DF6B-5E44-9E87-2B7073B0557B}"/>
-              </a:ext>
-            </a:extLst>
-          </p:cNvPr>
-          <p:cNvSpPr>
-            <a:spLocks noGrp="1"/>
-          </p:cNvSpPr>
-          <p:nvPr>
-            <p:ph idx="1"/>
-          </p:nvPr>
-        </p:nvSpPr>
-        <p:spPr>
-          <a:xfrm>
-            <a:off x="2231135" y="2638044"/>
-            <a:ext cx="8161561" cy="3101983"/>
-          </a:xfrm>
-        </p:spPr>
-        <p:txBody>
-          <a:bodyPr>
-            <a:normAutofit/>
-          </a:bodyPr>
-          <a:lstStyle/>
-          <a:p>
-            <a:r>
-              <a:rPr lang="en-US" dirty="0">
-                <a:solidFill>
-                  <a:schemeClr val="tx1"/>
-                </a:solidFill>
-              </a:rPr>
-              <a:t>For the project analysis,  raw data in excel was imported into a </a:t>
-            </a:r>
-            <a:r>
-              <a:rPr lang="en-US" dirty="0" err="1">
-                <a:solidFill>
-                  <a:schemeClr val="tx1"/>
-                </a:solidFill>
-              </a:rPr>
-              <a:t>Jupyter</a:t>
-            </a:r>
-            <a:r>
-              <a:rPr lang="en-US" dirty="0">
-                <a:solidFill>
-                  <a:schemeClr val="tx1"/>
-                </a:solidFill>
-              </a:rPr>
-              <a:t> Notebook for the creation of property-related Panda </a:t>
-            </a:r>
-            <a:r>
-              <a:rPr lang="en-US" dirty="0" err="1">
-                <a:solidFill>
-                  <a:schemeClr val="tx1"/>
-                </a:solidFill>
-              </a:rPr>
-              <a:t>DataFrames</a:t>
-            </a:r>
-            <a:r>
-              <a:rPr lang="en-US" dirty="0">
-                <a:solidFill>
-                  <a:schemeClr val="tx1"/>
-                </a:solidFill>
-              </a:rPr>
-              <a:t>. </a:t>
-            </a:r>
-          </a:p>
-          <a:p>
-            <a:pPr lvl="1"/>
-            <a:r>
-              <a:rPr lang="en-US" dirty="0">
-                <a:solidFill>
-                  <a:schemeClr val="tx1"/>
-                </a:solidFill>
-              </a:rPr>
-              <a:t>The median price of the raw data is available for each quarter (for the past five financial years)</a:t>
-            </a:r>
-          </a:p>
-          <a:p>
-            <a:pPr lvl="1"/>
-            <a:r>
-              <a:rPr lang="en-US" dirty="0">
-                <a:solidFill>
-                  <a:schemeClr val="tx1"/>
-                </a:solidFill>
-              </a:rPr>
-              <a:t>In order to determine if there is a correlation between crime counts and property prices,  one property price value was used for each financial year. This was was the mean of the four quarterly prices of each financial year</a:t>
-            </a:r>
-          </a:p>
-          <a:p>
-            <a:pPr lvl="1"/>
-            <a:r>
-              <a:rPr lang="en-US" dirty="0">
-                <a:solidFill>
-                  <a:schemeClr val="tx1"/>
-                </a:solidFill>
-              </a:rPr>
-              <a:t>The city and suburbs were provided for each property sale. Only the suburb column was used to merge between the crime </a:t>
-            </a:r>
-            <a:r>
-              <a:rPr lang="en-US" dirty="0" err="1">
-                <a:solidFill>
-                  <a:schemeClr val="tx1"/>
-                </a:solidFill>
-              </a:rPr>
-              <a:t>DataFrame</a:t>
-            </a:r>
-            <a:r>
-              <a:rPr lang="en-US" dirty="0">
-                <a:solidFill>
-                  <a:schemeClr val="tx1"/>
-                </a:solidFill>
-              </a:rPr>
-              <a:t> and the property price </a:t>
-            </a:r>
-            <a:r>
-              <a:rPr lang="en-US" dirty="0" err="1">
-                <a:solidFill>
-                  <a:schemeClr val="tx1"/>
-                </a:solidFill>
-              </a:rPr>
-              <a:t>DataFrame</a:t>
-            </a:r>
-            <a:endParaRPr lang="en-US" dirty="0">
-              <a:solidFill>
-                <a:schemeClr val="tx1"/>
-              </a:solidFill>
-            </a:endParaRPr>
-          </a:p>
-        </p:txBody>
-      </p:sp>
-    </p:spTree>
-    <p:extLst>
-      <p:ext uri="{BB962C8B-B14F-4D97-AF65-F5344CB8AC3E}">
-        <p14:creationId xmlns:p14="http://schemas.microsoft.com/office/powerpoint/2010/main" val="2047645864"/>
-      </p:ext>
-    </p:extLst>
-  </p:cSld>
-  <p:clrMapOvr>
-    <a:masterClrMapping/>
-  </p:clrMapOvr>
-</p:sld>
-</file>
-
-<file path=ppt/slides/slide7.xml><?xml version="1.0" encoding="utf-8"?>
 <p:sld xmlns:a="http://schemas.openxmlformats.org/drawingml/2006/main" xmlns:r="http://schemas.openxmlformats.org/officeDocument/2006/relationships" xmlns:p="http://schemas.openxmlformats.org/presentationml/2006/main">
   <p:cSld>
     <p:spTree>
@@ -10280,7 +9635,7 @@
 </p:sld>
 </file>
 
-<file path=ppt/slides/slide8.xml><?xml version="1.0" encoding="utf-8"?>
+<file path=ppt/slides/slide7.xml><?xml version="1.0" encoding="utf-8"?>
 <p:sld xmlns:a="http://schemas.openxmlformats.org/drawingml/2006/main" xmlns:r="http://schemas.openxmlformats.org/officeDocument/2006/relationships" xmlns:p="http://schemas.openxmlformats.org/presentationml/2006/main">
   <p:cSld>
     <p:spTree>
@@ -10421,7 +9776,7 @@
 </p:sld>
 </file>
 
-<file path=ppt/slides/slide9.xml><?xml version="1.0" encoding="utf-8"?>
+<file path=ppt/slides/slide8.xml><?xml version="1.0" encoding="utf-8"?>
 <p:sld xmlns:a="http://schemas.openxmlformats.org/drawingml/2006/main" xmlns:r="http://schemas.openxmlformats.org/officeDocument/2006/relationships" xmlns:p="http://schemas.openxmlformats.org/presentationml/2006/main">
   <p:cSld>
     <p:spTree>
@@ -10526,11 +9881,17 @@
           <p:cNvGraphicFramePr>
             <a:graphicFrameLocks noGrp="1"/>
           </p:cNvGraphicFramePr>
-          <p:nvPr/>
+          <p:nvPr>
+            <p:extLst>
+              <p:ext uri="{D42A27DB-BD31-4B8C-83A1-F6EECF244321}">
+                <p14:modId xmlns:p14="http://schemas.microsoft.com/office/powerpoint/2010/main" val="461169777"/>
+              </p:ext>
+            </p:extLst>
+          </p:nvPr>
         </p:nvGraphicFramePr>
         <p:xfrm>
-          <a:off x="6552612" y="3429000"/>
-          <a:ext cx="4597400" cy="1612900"/>
+          <a:off x="6345382" y="3200400"/>
+          <a:ext cx="4804631" cy="1841500"/>
         </p:xfrm>
         <a:graphic>
           <a:graphicData uri="http://schemas.openxmlformats.org/drawingml/2006/table">
@@ -10539,21 +9900,21 @@
                 <a:tableStyleId>{00A15C55-8517-42AA-B614-E9B94910E393}</a:tableStyleId>
               </a:tblPr>
               <a:tblGrid>
-                <a:gridCol w="1295400">
+                <a:gridCol w="1353791">
                   <a:extLst>
                     <a:ext uri="{9D8B030D-6E8A-4147-A177-3AD203B41FA5}">
                       <a16:colId xmlns:a16="http://schemas.microsoft.com/office/drawing/2014/main" val="999557224"/>
                     </a:ext>
                   </a:extLst>
                 </a:gridCol>
-                <a:gridCol w="1651000">
+                <a:gridCol w="1725420">
                   <a:extLst>
                     <a:ext uri="{9D8B030D-6E8A-4147-A177-3AD203B41FA5}">
                       <a16:colId xmlns:a16="http://schemas.microsoft.com/office/drawing/2014/main" val="432000542"/>
                     </a:ext>
                   </a:extLst>
                 </a:gridCol>
-                <a:gridCol w="1651000">
+                <a:gridCol w="1725420">
                   <a:extLst>
                     <a:ext uri="{9D8B030D-6E8A-4147-A177-3AD203B41FA5}">
                       <a16:colId xmlns:a16="http://schemas.microsoft.com/office/drawing/2014/main" val="1467077530"/>
@@ -10561,7 +9922,7 @@
                   </a:extLst>
                 </a:gridCol>
               </a:tblGrid>
-              <a:tr h="203200">
+              <a:tr h="232000">
                 <a:tc gridSpan="3">
                   <a:txBody>
                     <a:bodyPr/>
@@ -10648,7 +10009,7 @@
                   </a:ext>
                 </a:extLst>
               </a:tr>
-              <a:tr h="596900">
+              <a:tr h="681500">
                 <a:tc>
                   <a:txBody>
                     <a:bodyPr/>
@@ -10847,7 +10208,7 @@
                   </a:ext>
                 </a:extLst>
               </a:tr>
-              <a:tr h="203200">
+              <a:tr h="232000">
                 <a:tc>
                   <a:txBody>
                     <a:bodyPr/>
@@ -11034,7 +10395,7 @@
                   </a:ext>
                 </a:extLst>
               </a:tr>
-              <a:tr h="203200">
+              <a:tr h="232000">
                 <a:tc>
                   <a:txBody>
                     <a:bodyPr/>
@@ -11221,7 +10582,7 @@
                   </a:ext>
                 </a:extLst>
               </a:tr>
-              <a:tr h="203200">
+              <a:tr h="232000">
                 <a:tc>
                   <a:txBody>
                     <a:bodyPr/>
@@ -11408,7 +10769,7 @@
                   </a:ext>
                 </a:extLst>
               </a:tr>
-              <a:tr h="203200">
+              <a:tr h="232000">
                 <a:tc gridSpan="3">
                   <a:txBody>
                     <a:bodyPr/>
@@ -11503,6 +10864,203 @@
     <p:extLst>
       <p:ext uri="{BB962C8B-B14F-4D97-AF65-F5344CB8AC3E}">
         <p14:creationId xmlns:p14="http://schemas.microsoft.com/office/powerpoint/2010/main" val="1804729159"/>
+      </p:ext>
+    </p:extLst>
+  </p:cSld>
+  <p:clrMapOvr>
+    <a:masterClrMapping/>
+  </p:clrMapOvr>
+</p:sld>
+</file>
+
+<file path=ppt/slides/slide9.xml><?xml version="1.0" encoding="utf-8"?>
+<p:sld xmlns:a="http://schemas.openxmlformats.org/drawingml/2006/main" xmlns:r="http://schemas.openxmlformats.org/officeDocument/2006/relationships" xmlns:p="http://schemas.openxmlformats.org/presentationml/2006/main">
+  <p:cSld>
+    <p:spTree>
+      <p:nvGrpSpPr>
+        <p:cNvPr id="1" name=""/>
+        <p:cNvGrpSpPr/>
+        <p:nvPr/>
+      </p:nvGrpSpPr>
+      <p:grpSpPr>
+        <a:xfrm>
+          <a:off x="0" y="0"/>
+          <a:ext cx="0" cy="0"/>
+          <a:chOff x="0" y="0"/>
+          <a:chExt cx="0" cy="0"/>
+        </a:xfrm>
+      </p:grpSpPr>
+      <p:sp>
+        <p:nvSpPr>
+          <p:cNvPr id="2" name="Title 1">
+            <a:extLst>
+              <a:ext uri="{FF2B5EF4-FFF2-40B4-BE49-F238E27FC236}">
+                <a16:creationId xmlns:a16="http://schemas.microsoft.com/office/drawing/2014/main" id="{D4112190-B47C-470F-9F25-6023D45B677C}"/>
+              </a:ext>
+            </a:extLst>
+          </p:cNvPr>
+          <p:cNvSpPr>
+            <a:spLocks noGrp="1"/>
+          </p:cNvSpPr>
+          <p:nvPr>
+            <p:ph type="title"/>
+          </p:nvPr>
+        </p:nvSpPr>
+        <p:spPr/>
+        <p:txBody>
+          <a:bodyPr>
+            <a:normAutofit fontScale="90000"/>
+          </a:bodyPr>
+          <a:lstStyle/>
+          <a:p>
+            <a:r>
+              <a:rPr lang="en-US" dirty="0"/>
+              <a:t>Data </a:t>
+            </a:r>
+            <a:r>
+              <a:rPr lang="en-US" dirty="0" err="1"/>
+              <a:t>AnalysiS</a:t>
+            </a:r>
+            <a:br>
+              <a:rPr lang="en-US" dirty="0"/>
+            </a:br>
+            <a:r>
+              <a:rPr lang="en-US" dirty="0"/>
+              <a:t> Bottom 10 SUBURBS BY PROPERTY PRICE</a:t>
+            </a:r>
+            <a:br>
+              <a:rPr lang="en-US" dirty="0"/>
+            </a:br>
+            <a:endParaRPr lang="en-AU" dirty="0"/>
+          </a:p>
+        </p:txBody>
+      </p:sp>
+      <p:pic>
+        <p:nvPicPr>
+          <p:cNvPr id="7" name="Content Placeholder 6" descr="Icon&#10;&#10;Description automatically generated">
+            <a:extLst>
+              <a:ext uri="{FF2B5EF4-FFF2-40B4-BE49-F238E27FC236}">
+                <a16:creationId xmlns:a16="http://schemas.microsoft.com/office/drawing/2014/main" id="{8923D90D-FAAA-4BA0-9A62-313D6D654289}"/>
+              </a:ext>
+            </a:extLst>
+          </p:cNvPr>
+          <p:cNvPicPr>
+            <a:picLocks noGrp="1" noChangeAspect="1"/>
+          </p:cNvPicPr>
+          <p:nvPr>
+            <p:ph idx="1"/>
+          </p:nvPr>
+        </p:nvPicPr>
+        <p:blipFill>
+          <a:blip r:embed="rId3">
+            <a:extLst>
+              <a:ext uri="{28A0092B-C50C-407E-A947-70E740481C1C}">
+                <a14:useLocalDpi xmlns:a14="http://schemas.microsoft.com/office/drawing/2010/main" val="0"/>
+              </a:ext>
+            </a:extLst>
+          </a:blip>
+          <a:stretch>
+            <a:fillRect/>
+          </a:stretch>
+        </p:blipFill>
+        <p:spPr>
+          <a:xfrm>
+            <a:off x="1543147" y="2739435"/>
+            <a:ext cx="4949501" cy="3289225"/>
+          </a:xfrm>
+        </p:spPr>
+      </p:pic>
+      <p:sp>
+        <p:nvSpPr>
+          <p:cNvPr id="8" name="TextBox 7">
+            <a:extLst>
+              <a:ext uri="{FF2B5EF4-FFF2-40B4-BE49-F238E27FC236}">
+                <a16:creationId xmlns:a16="http://schemas.microsoft.com/office/drawing/2014/main" id="{14598C71-DC44-43A3-9A9E-C566B76F72B2}"/>
+              </a:ext>
+            </a:extLst>
+          </p:cNvPr>
+          <p:cNvSpPr txBox="1"/>
+          <p:nvPr/>
+        </p:nvSpPr>
+        <p:spPr>
+          <a:xfrm>
+            <a:off x="7051964" y="2739435"/>
+            <a:ext cx="2665228" cy="2585323"/>
+          </a:xfrm>
+          <a:prstGeom prst="rect">
+            <a:avLst/>
+          </a:prstGeom>
+          <a:noFill/>
+        </p:spPr>
+        <p:txBody>
+          <a:bodyPr wrap="square" rtlCol="0">
+            <a:spAutoFit/>
+          </a:bodyPr>
+          <a:lstStyle/>
+          <a:p>
+            <a:r>
+              <a:rPr lang="en-AU" dirty="0"/>
+              <a:t>Smithfield Plains</a:t>
+            </a:r>
+          </a:p>
+          <a:p>
+            <a:r>
+              <a:rPr lang="en-AU" dirty="0" err="1"/>
+              <a:t>Davoren</a:t>
+            </a:r>
+            <a:r>
+              <a:rPr lang="en-AU" dirty="0"/>
+              <a:t> Park</a:t>
+            </a:r>
+          </a:p>
+          <a:p>
+            <a:r>
+              <a:rPr lang="en-AU" dirty="0"/>
+              <a:t>Elizabeth Downs</a:t>
+            </a:r>
+          </a:p>
+          <a:p>
+            <a:r>
+              <a:rPr lang="en-AU" dirty="0"/>
+              <a:t>Elizabeth North</a:t>
+            </a:r>
+          </a:p>
+          <a:p>
+            <a:r>
+              <a:rPr lang="en-AU" dirty="0"/>
+              <a:t>Elizabeth Park</a:t>
+            </a:r>
+          </a:p>
+          <a:p>
+            <a:r>
+              <a:rPr lang="en-AU" dirty="0"/>
+              <a:t>Elizabeth East</a:t>
+            </a:r>
+          </a:p>
+          <a:p>
+            <a:r>
+              <a:rPr lang="en-AU" dirty="0"/>
+              <a:t>Elizabeth South</a:t>
+            </a:r>
+          </a:p>
+          <a:p>
+            <a:r>
+              <a:rPr lang="en-AU" dirty="0"/>
+              <a:t>Elizabeth</a:t>
+            </a:r>
+          </a:p>
+          <a:p>
+            <a:r>
+              <a:rPr lang="en-AU" dirty="0"/>
+              <a:t>Elizabeth Vale</a:t>
+            </a:r>
+          </a:p>
+        </p:txBody>
+      </p:sp>
+    </p:spTree>
+    <p:extLst>
+      <p:ext uri="{BB962C8B-B14F-4D97-AF65-F5344CB8AC3E}">
+        <p14:creationId xmlns:p14="http://schemas.microsoft.com/office/powerpoint/2010/main" val="788958099"/>
       </p:ext>
     </p:extLst>
   </p:cSld>

</xml_diff>

<commit_message>
update the bar chart
</commit_message>
<xml_diff>
--- a/Project 1 Presentation.pptx
+++ b/Project 1 Presentation.pptx
@@ -215,7 +215,7 @@
           <a:p>
             <a:fld id="{2429B6F7-E88D-5542-86AE-E68B90A8D5D5}" type="datetimeFigureOut">
               <a:rPr lang="en-US" smtClean="0"/>
-              <a:t>2/4/21</a:t>
+              <a:t>2/4/2021</a:t>
             </a:fld>
             <a:endParaRPr lang="en-US"/>
           </a:p>
@@ -2888,7 +2888,7 @@
           <a:p>
             <a:fld id="{FD85B985-76B1-472F-AE68-4120063CE451}" type="datetimeFigureOut">
               <a:rPr lang="en-AU" smtClean="0"/>
-              <a:t>4/2/21</a:t>
+              <a:t>4/02/2021</a:t>
             </a:fld>
             <a:endParaRPr lang="en-AU"/>
           </a:p>
@@ -3058,7 +3058,7 @@
           <a:p>
             <a:fld id="{FD85B985-76B1-472F-AE68-4120063CE451}" type="datetimeFigureOut">
               <a:rPr lang="en-AU" smtClean="0"/>
-              <a:t>4/2/21</a:t>
+              <a:t>4/02/2021</a:t>
             </a:fld>
             <a:endParaRPr lang="en-AU"/>
           </a:p>
@@ -3238,7 +3238,7 @@
           <a:p>
             <a:fld id="{FD85B985-76B1-472F-AE68-4120063CE451}" type="datetimeFigureOut">
               <a:rPr lang="en-AU" smtClean="0"/>
-              <a:t>4/2/21</a:t>
+              <a:t>4/02/2021</a:t>
             </a:fld>
             <a:endParaRPr lang="en-AU"/>
           </a:p>
@@ -3408,7 +3408,7 @@
           <a:p>
             <a:fld id="{FD85B985-76B1-472F-AE68-4120063CE451}" type="datetimeFigureOut">
               <a:rPr lang="en-AU" smtClean="0"/>
-              <a:t>4/2/21</a:t>
+              <a:t>4/02/2021</a:t>
             </a:fld>
             <a:endParaRPr lang="en-AU"/>
           </a:p>
@@ -3676,7 +3676,7 @@
           <a:p>
             <a:fld id="{FD85B985-76B1-472F-AE68-4120063CE451}" type="datetimeFigureOut">
               <a:rPr lang="en-AU" smtClean="0"/>
-              <a:t>4/2/21</a:t>
+              <a:t>4/02/2021</a:t>
             </a:fld>
             <a:endParaRPr lang="en-AU"/>
           </a:p>
@@ -3908,7 +3908,7 @@
           <a:p>
             <a:fld id="{FD85B985-76B1-472F-AE68-4120063CE451}" type="datetimeFigureOut">
               <a:rPr lang="en-AU" smtClean="0"/>
-              <a:t>4/2/21</a:t>
+              <a:t>4/02/2021</a:t>
             </a:fld>
             <a:endParaRPr lang="en-AU"/>
           </a:p>
@@ -4267,7 +4267,7 @@
           <a:p>
             <a:fld id="{FD85B985-76B1-472F-AE68-4120063CE451}" type="datetimeFigureOut">
               <a:rPr lang="en-AU" smtClean="0"/>
-              <a:t>4/2/21</a:t>
+              <a:t>4/02/2021</a:t>
             </a:fld>
             <a:endParaRPr lang="en-AU"/>
           </a:p>
@@ -4408,7 +4408,7 @@
           <a:p>
             <a:fld id="{FD85B985-76B1-472F-AE68-4120063CE451}" type="datetimeFigureOut">
               <a:rPr lang="en-AU" smtClean="0"/>
-              <a:t>4/2/21</a:t>
+              <a:t>4/02/2021</a:t>
             </a:fld>
             <a:endParaRPr lang="en-AU"/>
           </a:p>
@@ -4503,7 +4503,7 @@
           <a:p>
             <a:fld id="{FD85B985-76B1-472F-AE68-4120063CE451}" type="datetimeFigureOut">
               <a:rPr lang="en-AU" smtClean="0"/>
-              <a:t>4/2/21</a:t>
+              <a:t>4/02/2021</a:t>
             </a:fld>
             <a:endParaRPr lang="en-AU"/>
           </a:p>
@@ -4860,7 +4860,7 @@
           <a:p>
             <a:fld id="{FD85B985-76B1-472F-AE68-4120063CE451}" type="datetimeFigureOut">
               <a:rPr lang="en-AU" smtClean="0"/>
-              <a:t>4/2/21</a:t>
+              <a:t>4/02/2021</a:t>
             </a:fld>
             <a:endParaRPr lang="en-AU"/>
           </a:p>
@@ -5217,7 +5217,7 @@
           <a:p>
             <a:fld id="{FD85B985-76B1-472F-AE68-4120063CE451}" type="datetimeFigureOut">
               <a:rPr lang="en-AU" smtClean="0"/>
-              <a:t>4/2/21</a:t>
+              <a:t>4/02/2021</a:t>
             </a:fld>
             <a:endParaRPr lang="en-AU"/>
           </a:p>
@@ -5459,7 +5459,7 @@
           <a:p>
             <a:fld id="{FD85B985-76B1-472F-AE68-4120063CE451}" type="datetimeFigureOut">
               <a:rPr lang="en-AU" smtClean="0"/>
-              <a:t>4/2/21</a:t>
+              <a:t>4/02/2021</a:t>
             </a:fld>
             <a:endParaRPr lang="en-AU"/>
           </a:p>
@@ -6323,7 +6323,9 @@
         </p:nvSpPr>
         <p:spPr/>
         <p:txBody>
-          <a:bodyPr/>
+          <a:bodyPr>
+            <a:normAutofit fontScale="90000"/>
+          </a:bodyPr>
           <a:lstStyle/>
           <a:p>
             <a:r>
@@ -6339,7 +6341,7 @@
             </a:br>
             <a:r>
               <a:rPr lang="en-US" dirty="0"/>
-              <a:t> TOP 10 SUBURBS BY PROPERTY PRICE</a:t>
+              <a:t> Bottom 10 SUBURBS BY PROPERTY PRICE</a:t>
             </a:r>
             <a:endParaRPr lang="en-AU" dirty="0"/>
           </a:p>
@@ -6347,10 +6349,10 @@
       </p:sp>
       <p:pic>
         <p:nvPicPr>
-          <p:cNvPr id="6" name="Picture 5" descr="Icon&#10;&#10;Description automatically generated">
+          <p:cNvPr id="4" name="Picture 3" descr="Icon&#10;&#10;Description automatically generated">
             <a:extLst>
               <a:ext uri="{FF2B5EF4-FFF2-40B4-BE49-F238E27FC236}">
-                <a16:creationId xmlns:a16="http://schemas.microsoft.com/office/drawing/2014/main" id="{560F708A-7AF5-4618-9AB2-12689695337D}"/>
+                <a16:creationId xmlns:a16="http://schemas.microsoft.com/office/drawing/2014/main" id="{CEA2BCB7-41BE-4E8F-A25B-CF7AA04DA81D}"/>
               </a:ext>
             </a:extLst>
           </p:cNvPr>
@@ -6373,8 +6375,44 @@
         </p:blipFill>
         <p:spPr>
           <a:xfrm>
-            <a:off x="6671199" y="2795470"/>
-            <a:ext cx="4542503" cy="3097838"/>
+            <a:off x="132226" y="2744916"/>
+            <a:ext cx="5061248" cy="3363488"/>
+          </a:xfrm>
+          <a:prstGeom prst="rect">
+            <a:avLst/>
+          </a:prstGeom>
+        </p:spPr>
+      </p:pic>
+      <p:pic>
+        <p:nvPicPr>
+          <p:cNvPr id="8" name="Picture 7" descr="Icon&#10;&#10;Description automatically generated">
+            <a:extLst>
+              <a:ext uri="{FF2B5EF4-FFF2-40B4-BE49-F238E27FC236}">
+                <a16:creationId xmlns:a16="http://schemas.microsoft.com/office/drawing/2014/main" id="{A5B96C2D-A48A-4E33-9BF7-447B4C992D72}"/>
+              </a:ext>
+            </a:extLst>
+          </p:cNvPr>
+          <p:cNvPicPr>
+            <a:picLocks noChangeAspect="1"/>
+          </p:cNvPicPr>
+          <p:nvPr/>
+        </p:nvPicPr>
+        <p:blipFill>
+          <a:blip r:embed="rId4">
+            <a:extLst>
+              <a:ext uri="{28A0092B-C50C-407E-A947-70E740481C1C}">
+                <a14:useLocalDpi xmlns:a14="http://schemas.microsoft.com/office/drawing/2010/main" val="0"/>
+              </a:ext>
+            </a:extLst>
+          </a:blip>
+          <a:stretch>
+            <a:fillRect/>
+          </a:stretch>
+        </p:blipFill>
+        <p:spPr>
+          <a:xfrm>
+            <a:off x="5437107" y="2803395"/>
+            <a:ext cx="4565266" cy="3172103"/>
           </a:xfrm>
           <a:prstGeom prst="rect">
             <a:avLst/>
@@ -6429,7 +6467,9 @@
         </p:nvSpPr>
         <p:spPr/>
         <p:txBody>
-          <a:bodyPr/>
+          <a:bodyPr>
+            <a:normAutofit fontScale="90000"/>
+          </a:bodyPr>
           <a:lstStyle/>
           <a:p>
             <a:r>
@@ -6445,7 +6485,7 @@
             </a:br>
             <a:r>
               <a:rPr lang="en-US" dirty="0"/>
-              <a:t> TOP 10 SUBURBS BY PROPERTY PRICE</a:t>
+              <a:t> Bottom 10 SUBURBS BY PROPERTY PRICE</a:t>
             </a:r>
             <a:endParaRPr lang="en-AU" dirty="0"/>
           </a:p>
@@ -6453,7 +6493,7 @@
       </p:sp>
       <p:pic>
         <p:nvPicPr>
-          <p:cNvPr id="5" name="Content Placeholder 4" descr="Icon&#10;&#10;Description automatically generated">
+          <p:cNvPr id="5" name="Content Placeholder 4">
             <a:extLst>
               <a:ext uri="{FF2B5EF4-FFF2-40B4-BE49-F238E27FC236}">
                 <a16:creationId xmlns:a16="http://schemas.microsoft.com/office/drawing/2014/main" id="{53B60C00-7268-4D8D-87AE-177F94376CF4}"/>
@@ -6475,20 +6515,19 @@
               </a:ext>
             </a:extLst>
           </a:blip>
-          <a:stretch>
-            <a:fillRect/>
-          </a:stretch>
+          <a:srcRect/>
+          <a:stretch/>
         </p:blipFill>
         <p:spPr>
           <a:xfrm>
-            <a:off x="6523694" y="2791332"/>
-            <a:ext cx="4593309" cy="3101975"/>
+            <a:off x="4849066" y="2791331"/>
+            <a:ext cx="4593309" cy="3052515"/>
           </a:xfrm>
         </p:spPr>
       </p:pic>
       <p:pic>
         <p:nvPicPr>
-          <p:cNvPr id="6" name="Content Placeholder 4" descr="Icon&#10;&#10;Description automatically generated">
+          <p:cNvPr id="6" name="Content Placeholder 4">
             <a:extLst>
               <a:ext uri="{FF2B5EF4-FFF2-40B4-BE49-F238E27FC236}">
                 <a16:creationId xmlns:a16="http://schemas.microsoft.com/office/drawing/2014/main" id="{1389C4C6-FAF5-47AD-A090-87965B0B2ED8}"/>
@@ -6508,14 +6547,13 @@
               </a:ext>
             </a:extLst>
           </a:blip>
-          <a:stretch>
-            <a:fillRect/>
-          </a:stretch>
+          <a:srcRect/>
+          <a:stretch/>
         </p:blipFill>
         <p:spPr>
           <a:xfrm>
-            <a:off x="1308237" y="2791333"/>
-            <a:ext cx="4593309" cy="3101975"/>
+            <a:off x="133339" y="2791332"/>
+            <a:ext cx="4593309" cy="3052515"/>
           </a:xfrm>
           <a:prstGeom prst="rect">
             <a:avLst/>
@@ -8764,7 +8802,7 @@
             </a:br>
             <a:r>
               <a:rPr lang="en-US" dirty="0"/>
-              <a:t> TOP 10 SUBURBS BY PROPERTY PRICE</a:t>
+              <a:t> Bottom 10 SUBURBS BY PROPERTY PRICE</a:t>
             </a:r>
             <a:br>
               <a:rPr lang="en-US" dirty="0"/>
@@ -8775,10 +8813,10 @@
       </p:sp>
       <p:pic>
         <p:nvPicPr>
-          <p:cNvPr id="5" name="Content Placeholder 4" descr="Icon&#10;&#10;Description automatically generated">
+          <p:cNvPr id="7" name="Content Placeholder 6" descr="Icon&#10;&#10;Description automatically generated">
             <a:extLst>
               <a:ext uri="{FF2B5EF4-FFF2-40B4-BE49-F238E27FC236}">
-                <a16:creationId xmlns:a16="http://schemas.microsoft.com/office/drawing/2014/main" id="{8C3E7055-D6FF-4E94-8DBD-D142F3407FF2}"/>
+                <a16:creationId xmlns:a16="http://schemas.microsoft.com/office/drawing/2014/main" id="{8923D90D-FAAA-4BA0-9A62-313D6D654289}"/>
               </a:ext>
             </a:extLst>
           </p:cNvPr>
@@ -8803,11 +8841,98 @@
         </p:blipFill>
         <p:spPr>
           <a:xfrm>
-            <a:off x="1137510" y="2795469"/>
-            <a:ext cx="4542500" cy="3097837"/>
+            <a:off x="614892" y="2739435"/>
+            <a:ext cx="4949501" cy="3289225"/>
           </a:xfrm>
         </p:spPr>
       </p:pic>
+      <p:sp>
+        <p:nvSpPr>
+          <p:cNvPr id="8" name="TextBox 7">
+            <a:extLst>
+              <a:ext uri="{FF2B5EF4-FFF2-40B4-BE49-F238E27FC236}">
+                <a16:creationId xmlns:a16="http://schemas.microsoft.com/office/drawing/2014/main" id="{14598C71-DC44-43A3-9A9E-C566B76F72B2}"/>
+              </a:ext>
+            </a:extLst>
+          </p:cNvPr>
+          <p:cNvSpPr txBox="1"/>
+          <p:nvPr/>
+        </p:nvSpPr>
+        <p:spPr>
+          <a:xfrm>
+            <a:off x="6096000" y="2739435"/>
+            <a:ext cx="2665228" cy="2585323"/>
+          </a:xfrm>
+          <a:prstGeom prst="rect">
+            <a:avLst/>
+          </a:prstGeom>
+          <a:noFill/>
+        </p:spPr>
+        <p:txBody>
+          <a:bodyPr wrap="square" rtlCol="0">
+            <a:spAutoFit/>
+          </a:bodyPr>
+          <a:lstStyle/>
+          <a:p>
+            <a:r>
+              <a:rPr lang="en-AU" dirty="0"/>
+              <a:t>Smithfield Plains</a:t>
+            </a:r>
+          </a:p>
+          <a:p>
+            <a:r>
+              <a:rPr lang="en-AU" dirty="0" err="1"/>
+              <a:t>Davoren</a:t>
+            </a:r>
+            <a:r>
+              <a:rPr lang="en-AU" dirty="0"/>
+              <a:t> Park</a:t>
+            </a:r>
+          </a:p>
+          <a:p>
+            <a:r>
+              <a:rPr lang="en-AU" dirty="0"/>
+              <a:t>Elizabeth Downs</a:t>
+            </a:r>
+          </a:p>
+          <a:p>
+            <a:r>
+              <a:rPr lang="en-AU" dirty="0"/>
+              <a:t>Elizabeth North</a:t>
+            </a:r>
+          </a:p>
+          <a:p>
+            <a:r>
+              <a:rPr lang="en-AU" dirty="0"/>
+              <a:t>Elizabeth Park</a:t>
+            </a:r>
+          </a:p>
+          <a:p>
+            <a:r>
+              <a:rPr lang="en-AU" dirty="0"/>
+              <a:t>Elizabeth East</a:t>
+            </a:r>
+          </a:p>
+          <a:p>
+            <a:r>
+              <a:rPr lang="en-AU" dirty="0"/>
+              <a:t>Elizabeth South</a:t>
+            </a:r>
+          </a:p>
+          <a:p>
+            <a:r>
+              <a:rPr lang="en-AU" dirty="0"/>
+              <a:t>Elizabeth</a:t>
+            </a:r>
+          </a:p>
+          <a:p>
+            <a:r>
+              <a:rPr lang="en-AU" dirty="0"/>
+              <a:t>Elizabeth Vale</a:t>
+            </a:r>
+          </a:p>
+        </p:txBody>
+      </p:sp>
     </p:spTree>
     <p:extLst>
       <p:ext uri="{BB962C8B-B14F-4D97-AF65-F5344CB8AC3E}">

</xml_diff>